<commit_message>
poster added signal image
</commit_message>
<xml_diff>
--- a/poster/poster.pptx
+++ b/poster/poster.pptx
@@ -5105,7 +5105,7 @@
               <a:graphicData uri="http://schemas.openxmlformats.org/presentationml/2006/ole">
                 <mc:AlternateContent xmlns:mc="http://schemas.openxmlformats.org/markup-compatibility/2006">
                   <mc:Choice xmlns:v="urn:schemas-microsoft-com:vml" Requires="v">
-                    <p:oleObj spid="_x0000_s1055" name="Image" r:id="rId8" imgW="1828440" imgH="1117440" progId="Photoshop.Image.13">
+                    <p:oleObj spid="_x0000_s1091" name="Image" r:id="rId8" imgW="1828440" imgH="1117440" progId="Photoshop.Image.13">
                       <p:embed/>
                     </p:oleObj>
                   </mc:Choice>
@@ -5162,7 +5162,7 @@
               <a:graphicData uri="http://schemas.openxmlformats.org/presentationml/2006/ole">
                 <mc:AlternateContent xmlns:mc="http://schemas.openxmlformats.org/markup-compatibility/2006">
                   <mc:Choice xmlns:v="urn:schemas-microsoft-com:vml" Requires="v">
-                    <p:oleObj spid="_x0000_s1056" name="Image" r:id="rId10" imgW="1828440" imgH="1117440" progId="Photoshop.Image.13">
+                    <p:oleObj spid="_x0000_s1092" name="Image" r:id="rId10" imgW="1828440" imgH="1117440" progId="Photoshop.Image.13">
                       <p:embed/>
                     </p:oleObj>
                   </mc:Choice>
@@ -6312,7 +6312,7 @@
             <a:graphicData uri="http://schemas.openxmlformats.org/presentationml/2006/ole">
               <mc:AlternateContent xmlns:mc="http://schemas.openxmlformats.org/markup-compatibility/2006">
                 <mc:Choice xmlns:v="urn:schemas-microsoft-com:vml" Requires="v">
-                  <p:oleObj spid="_x0000_s1057" name="Image" r:id="rId12" imgW="4571280" imgH="1688760" progId="Photoshop.Image.13">
+                  <p:oleObj spid="_x0000_s1093" name="Image" r:id="rId12" imgW="4571280" imgH="1688760" progId="Photoshop.Image.13">
                     <p:embed/>
                   </p:oleObj>
                 </mc:Choice>
@@ -6396,7 +6396,7 @@
             <a:graphicData uri="http://schemas.openxmlformats.org/presentationml/2006/ole">
               <mc:AlternateContent xmlns:mc="http://schemas.openxmlformats.org/markup-compatibility/2006">
                 <mc:Choice xmlns:v="urn:schemas-microsoft-com:vml" Requires="v">
-                  <p:oleObj spid="_x0000_s1058" name="Image" r:id="rId15" imgW="1574280" imgH="1053720" progId="Photoshop.Image.13">
+                  <p:oleObj spid="_x0000_s1094" name="Image" r:id="rId15" imgW="1574280" imgH="1053720" progId="Photoshop.Image.13">
                     <p:embed/>
                   </p:oleObj>
                 </mc:Choice>
@@ -8610,7 +8610,7 @@
               <a:graphicData uri="http://schemas.openxmlformats.org/presentationml/2006/ole">
                 <mc:AlternateContent xmlns:mc="http://schemas.openxmlformats.org/markup-compatibility/2006">
                   <mc:Choice xmlns:v="urn:schemas-microsoft-com:vml" Requires="v">
-                    <p:oleObj spid="_x0000_s2079" name="Image" r:id="rId8" imgW="1828440" imgH="1117440" progId="Photoshop.Image.13">
+                    <p:oleObj spid="_x0000_s2115" name="Image" r:id="rId8" imgW="1828440" imgH="1117440" progId="Photoshop.Image.13">
                       <p:embed/>
                     </p:oleObj>
                   </mc:Choice>
@@ -8667,7 +8667,7 @@
               <a:graphicData uri="http://schemas.openxmlformats.org/presentationml/2006/ole">
                 <mc:AlternateContent xmlns:mc="http://schemas.openxmlformats.org/markup-compatibility/2006">
                   <mc:Choice xmlns:v="urn:schemas-microsoft-com:vml" Requires="v">
-                    <p:oleObj spid="_x0000_s2080" name="Image" r:id="rId10" imgW="1828440" imgH="1117440" progId="Photoshop.Image.13">
+                    <p:oleObj spid="_x0000_s2116" name="Image" r:id="rId10" imgW="1828440" imgH="1117440" progId="Photoshop.Image.13">
                       <p:embed/>
                     </p:oleObj>
                   </mc:Choice>
@@ -9817,7 +9817,7 @@
             <a:graphicData uri="http://schemas.openxmlformats.org/presentationml/2006/ole">
               <mc:AlternateContent xmlns:mc="http://schemas.openxmlformats.org/markup-compatibility/2006">
                 <mc:Choice xmlns:v="urn:schemas-microsoft-com:vml" Requires="v">
-                  <p:oleObj spid="_x0000_s2081" name="Image" r:id="rId12" imgW="4571280" imgH="1688760" progId="Photoshop.Image.13">
+                  <p:oleObj spid="_x0000_s2117" name="Image" r:id="rId12" imgW="4571280" imgH="1688760" progId="Photoshop.Image.13">
                     <p:embed/>
                   </p:oleObj>
                 </mc:Choice>
@@ -9901,7 +9901,7 @@
             <a:graphicData uri="http://schemas.openxmlformats.org/presentationml/2006/ole">
               <mc:AlternateContent xmlns:mc="http://schemas.openxmlformats.org/markup-compatibility/2006">
                 <mc:Choice xmlns:v="urn:schemas-microsoft-com:vml" Requires="v">
-                  <p:oleObj spid="_x0000_s2082" name="Image" r:id="rId15" imgW="1574280" imgH="1053720" progId="Photoshop.Image.13">
+                  <p:oleObj spid="_x0000_s2118" name="Image" r:id="rId15" imgW="1574280" imgH="1053720" progId="Photoshop.Image.13">
                     <p:embed/>
                   </p:oleObj>
                 </mc:Choice>
@@ -12000,7 +12000,7 @@
               <a:graphicData uri="http://schemas.openxmlformats.org/presentationml/2006/ole">
                 <mc:AlternateContent xmlns:mc="http://schemas.openxmlformats.org/markup-compatibility/2006">
                   <mc:Choice xmlns:v="urn:schemas-microsoft-com:vml" Requires="v">
-                    <p:oleObj spid="_x0000_s3103" name="Image" r:id="rId8" imgW="1828440" imgH="1117440" progId="Photoshop.Image.13">
+                    <p:oleObj spid="_x0000_s3139" name="Image" r:id="rId8" imgW="1828440" imgH="1117440" progId="Photoshop.Image.13">
                       <p:embed/>
                     </p:oleObj>
                   </mc:Choice>
@@ -12057,7 +12057,7 @@
               <a:graphicData uri="http://schemas.openxmlformats.org/presentationml/2006/ole">
                 <mc:AlternateContent xmlns:mc="http://schemas.openxmlformats.org/markup-compatibility/2006">
                   <mc:Choice xmlns:v="urn:schemas-microsoft-com:vml" Requires="v">
-                    <p:oleObj spid="_x0000_s3104" name="Image" r:id="rId10" imgW="1828440" imgH="1117440" progId="Photoshop.Image.13">
+                    <p:oleObj spid="_x0000_s3140" name="Image" r:id="rId10" imgW="1828440" imgH="1117440" progId="Photoshop.Image.13">
                       <p:embed/>
                     </p:oleObj>
                   </mc:Choice>
@@ -13207,7 +13207,7 @@
             <a:graphicData uri="http://schemas.openxmlformats.org/presentationml/2006/ole">
               <mc:AlternateContent xmlns:mc="http://schemas.openxmlformats.org/markup-compatibility/2006">
                 <mc:Choice xmlns:v="urn:schemas-microsoft-com:vml" Requires="v">
-                  <p:oleObj spid="_x0000_s3105" name="Image" r:id="rId12" imgW="4571280" imgH="1688760" progId="Photoshop.Image.13">
+                  <p:oleObj spid="_x0000_s3141" name="Image" r:id="rId12" imgW="4571280" imgH="1688760" progId="Photoshop.Image.13">
                     <p:embed/>
                   </p:oleObj>
                 </mc:Choice>
@@ -13291,7 +13291,7 @@
             <a:graphicData uri="http://schemas.openxmlformats.org/presentationml/2006/ole">
               <mc:AlternateContent xmlns:mc="http://schemas.openxmlformats.org/markup-compatibility/2006">
                 <mc:Choice xmlns:v="urn:schemas-microsoft-com:vml" Requires="v">
-                  <p:oleObj spid="_x0000_s3106" name="Image" r:id="rId15" imgW="1574280" imgH="1053720" progId="Photoshop.Image.13">
+                  <p:oleObj spid="_x0000_s3142" name="Image" r:id="rId15" imgW="1574280" imgH="1053720" progId="Photoshop.Image.13">
                     <p:embed/>
                   </p:oleObj>
                 </mc:Choice>
@@ -17366,20 +17366,20 @@
           <p:nvPr>
             <p:extLst>
               <p:ext uri="{D42A27DB-BD31-4B8C-83A1-F6EECF244321}">
-                <p14:modId xmlns:p14="http://schemas.microsoft.com/office/powerpoint/2010/main" val="3367366051"/>
+                <p14:modId xmlns:p14="http://schemas.microsoft.com/office/powerpoint/2010/main" val="467041098"/>
               </p:ext>
             </p:extLst>
           </p:nvPr>
         </p:nvGraphicFramePr>
         <p:xfrm>
-          <a:off x="32408374" y="26421477"/>
+          <a:off x="32408374" y="12994116"/>
           <a:ext cx="7886351" cy="6362376"/>
         </p:xfrm>
         <a:graphic>
           <a:graphicData uri="http://schemas.openxmlformats.org/drawingml/2006/table">
             <a:tbl>
               <a:tblPr firstRow="1" bandRow="1">
-                <a:tableStyleId>{F5AB1C69-6EDB-4FF4-983F-18BD219EF322}</a:tableStyleId>
+                <a:tableStyleId>{7DF18680-E054-41AD-8BC1-D1AEF772440D}</a:tableStyleId>
               </a:tblPr>
               <a:tblGrid>
                 <a:gridCol w="1486434"/>
@@ -17394,27 +17394,15 @@
                     <a:p>
                       <a:pPr algn="ctr"/>
                       <a:r>
-                        <a:rPr lang="en-US" sz="2000" dirty="0" smtClean="0">
-                          <a:solidFill>
-                            <a:schemeClr val="tx1"/>
-                          </a:solidFill>
-                        </a:rPr>
+                        <a:rPr lang="en-US" sz="2000" dirty="0" smtClean="0"/>
                         <a:t>Labeled</a:t>
                       </a:r>
                       <a:r>
-                        <a:rPr lang="en-US" sz="2000" baseline="0" dirty="0" smtClean="0">
-                          <a:solidFill>
-                            <a:schemeClr val="tx1"/>
-                          </a:solidFill>
-                        </a:rPr>
+                        <a:rPr lang="en-US" sz="2000" baseline="0" dirty="0" smtClean="0"/>
                         <a:t> </a:t>
                       </a:r>
                       <a:r>
-                        <a:rPr lang="en-US" sz="2000" dirty="0" smtClean="0">
-                          <a:solidFill>
-                            <a:schemeClr val="tx1"/>
-                          </a:solidFill>
-                        </a:rPr>
+                        <a:rPr lang="en-US" sz="2000" dirty="0" smtClean="0"/>
                         <a:t>Dataset</a:t>
                       </a:r>
                       <a:endParaRPr lang="en-US" sz="2000" dirty="0">
@@ -17433,11 +17421,7 @@
                     <a:p>
                       <a:pPr algn="ctr"/>
                       <a:r>
-                        <a:rPr lang="en-US" sz="2000" dirty="0" smtClean="0">
-                          <a:solidFill>
-                            <a:schemeClr val="tx1"/>
-                          </a:solidFill>
-                        </a:rPr>
+                        <a:rPr lang="en-US" sz="2000" dirty="0" smtClean="0"/>
                         <a:t>Algorithm</a:t>
                       </a:r>
                       <a:endParaRPr lang="en-US" sz="2000" dirty="0">
@@ -17456,11 +17440,7 @@
                     <a:p>
                       <a:pPr algn="ctr"/>
                       <a:r>
-                        <a:rPr lang="en-US" sz="2000" dirty="0" smtClean="0">
-                          <a:solidFill>
-                            <a:schemeClr val="tx1"/>
-                          </a:solidFill>
-                        </a:rPr>
+                        <a:rPr lang="en-US" sz="2000" dirty="0" smtClean="0"/>
                         <a:t>Test Accuracy (%)</a:t>
                       </a:r>
                       <a:endParaRPr lang="en-US" sz="2000" dirty="0">
@@ -17927,6 +17907,361 @@
           </a:graphicData>
         </a:graphic>
       </p:graphicFrame>
+      <p:graphicFrame>
+        <p:nvGraphicFramePr>
+          <p:cNvPr id="157" name="Table 156"/>
+          <p:cNvGraphicFramePr>
+            <a:graphicFrameLocks noGrp="1"/>
+          </p:cNvGraphicFramePr>
+          <p:nvPr>
+            <p:extLst>
+              <p:ext uri="{D42A27DB-BD31-4B8C-83A1-F6EECF244321}">
+                <p14:modId xmlns:p14="http://schemas.microsoft.com/office/powerpoint/2010/main" val="2743974997"/>
+              </p:ext>
+            </p:extLst>
+          </p:nvPr>
+        </p:nvGraphicFramePr>
+        <p:xfrm>
+          <a:off x="33085686" y="27431210"/>
+          <a:ext cx="6248400" cy="3474720"/>
+        </p:xfrm>
+        <a:graphic>
+          <a:graphicData uri="http://schemas.openxmlformats.org/drawingml/2006/table">
+            <a:tbl>
+              <a:tblPr firstRow="1" bandRow="1">
+                <a:tableStyleId>{5C22544A-7EE6-4342-B048-85BDC9FD1C3A}</a:tableStyleId>
+              </a:tblPr>
+              <a:tblGrid>
+                <a:gridCol w="3124200"/>
+                <a:gridCol w="3124200"/>
+              </a:tblGrid>
+              <a:tr h="370840">
+                <a:tc>
+                  <a:txBody>
+                    <a:bodyPr/>
+                    <a:lstStyle/>
+                    <a:p>
+                      <a:pPr algn="ctr"/>
+                      <a:r>
+                        <a:rPr lang="en-US" sz="2000" dirty="0" smtClean="0"/>
+                        <a:t># errors</a:t>
+                      </a:r>
+                      <a:r>
+                        <a:rPr lang="en-US" sz="2000" baseline="0" dirty="0" smtClean="0"/>
+                        <a:t> (L/R, U/D)</a:t>
+                      </a:r>
+                      <a:endParaRPr lang="en-US" sz="2000" dirty="0"/>
+                    </a:p>
+                  </a:txBody>
+                  <a:tcPr/>
+                </a:tc>
+                <a:tc>
+                  <a:txBody>
+                    <a:bodyPr/>
+                    <a:lstStyle/>
+                    <a:p>
+                      <a:pPr algn="ctr"/>
+                      <a:r>
+                        <a:rPr lang="en-US" sz="2000" dirty="0" smtClean="0"/>
+                        <a:t>Recovered</a:t>
+                      </a:r>
+                      <a:r>
+                        <a:rPr lang="en-US" sz="2000" baseline="0" dirty="0" smtClean="0"/>
+                        <a:t> Words Accuracy (%)</a:t>
+                      </a:r>
+                      <a:endParaRPr lang="en-US" sz="2000" dirty="0"/>
+                    </a:p>
+                  </a:txBody>
+                  <a:tcPr/>
+                </a:tc>
+              </a:tr>
+              <a:tr h="370840">
+                <a:tc>
+                  <a:txBody>
+                    <a:bodyPr/>
+                    <a:lstStyle/>
+                    <a:p>
+                      <a:pPr algn="ctr"/>
+                      <a:r>
+                        <a:rPr lang="en-US" sz="2000" dirty="0" smtClean="0"/>
+                        <a:t>0</a:t>
+                      </a:r>
+                    </a:p>
+                  </a:txBody>
+                  <a:tcPr/>
+                </a:tc>
+                <a:tc>
+                  <a:txBody>
+                    <a:bodyPr/>
+                    <a:lstStyle/>
+                    <a:p>
+                      <a:pPr algn="ctr"/>
+                      <a:r>
+                        <a:rPr lang="en-US" sz="2000" dirty="0" smtClean="0"/>
+                        <a:t>5.46</a:t>
+                      </a:r>
+                      <a:endParaRPr lang="en-US" sz="2000" dirty="0"/>
+                    </a:p>
+                  </a:txBody>
+                  <a:tcPr/>
+                </a:tc>
+              </a:tr>
+              <a:tr h="370840">
+                <a:tc>
+                  <a:txBody>
+                    <a:bodyPr/>
+                    <a:lstStyle/>
+                    <a:p>
+                      <a:pPr algn="ctr"/>
+                      <a:r>
+                        <a:rPr lang="en-US" sz="2000" dirty="0" smtClean="0"/>
+                        <a:t>1</a:t>
+                      </a:r>
+                      <a:endParaRPr lang="en-US" sz="2000" dirty="0"/>
+                    </a:p>
+                  </a:txBody>
+                  <a:tcPr/>
+                </a:tc>
+                <a:tc>
+                  <a:txBody>
+                    <a:bodyPr/>
+                    <a:lstStyle/>
+                    <a:p>
+                      <a:pPr algn="ctr"/>
+                      <a:r>
+                        <a:rPr lang="en-US" sz="2000" dirty="0" smtClean="0"/>
+                        <a:t>23.41</a:t>
+                      </a:r>
+                      <a:endParaRPr lang="en-US" sz="2000" dirty="0"/>
+                    </a:p>
+                  </a:txBody>
+                  <a:tcPr/>
+                </a:tc>
+              </a:tr>
+              <a:tr h="370840">
+                <a:tc>
+                  <a:txBody>
+                    <a:bodyPr/>
+                    <a:lstStyle/>
+                    <a:p>
+                      <a:pPr algn="ctr"/>
+                      <a:r>
+                        <a:rPr lang="en-US" sz="2000" dirty="0" smtClean="0"/>
+                        <a:t>2</a:t>
+                      </a:r>
+                      <a:endParaRPr lang="en-US" sz="2000" dirty="0"/>
+                    </a:p>
+                  </a:txBody>
+                  <a:tcPr/>
+                </a:tc>
+                <a:tc>
+                  <a:txBody>
+                    <a:bodyPr/>
+                    <a:lstStyle/>
+                    <a:p>
+                      <a:pPr algn="ctr"/>
+                      <a:r>
+                        <a:rPr lang="en-US" sz="2000" dirty="0" smtClean="0"/>
+                        <a:t>41.64</a:t>
+                      </a:r>
+                      <a:endParaRPr lang="en-US" sz="2000" dirty="0"/>
+                    </a:p>
+                  </a:txBody>
+                  <a:tcPr/>
+                </a:tc>
+              </a:tr>
+              <a:tr h="370840">
+                <a:tc>
+                  <a:txBody>
+                    <a:bodyPr/>
+                    <a:lstStyle/>
+                    <a:p>
+                      <a:pPr algn="ctr"/>
+                      <a:r>
+                        <a:rPr lang="en-US" sz="2000" dirty="0" smtClean="0"/>
+                        <a:t>3</a:t>
+                      </a:r>
+                      <a:endParaRPr lang="en-US" sz="2000" dirty="0"/>
+                    </a:p>
+                  </a:txBody>
+                  <a:tcPr/>
+                </a:tc>
+                <a:tc>
+                  <a:txBody>
+                    <a:bodyPr/>
+                    <a:lstStyle/>
+                    <a:p>
+                      <a:pPr algn="ctr"/>
+                      <a:r>
+                        <a:rPr lang="en-US" sz="2000" dirty="0" smtClean="0"/>
+                        <a:t>70.31</a:t>
+                      </a:r>
+                      <a:endParaRPr lang="en-US" sz="2000" dirty="0"/>
+                    </a:p>
+                  </a:txBody>
+                  <a:tcPr/>
+                </a:tc>
+              </a:tr>
+              <a:tr h="370840">
+                <a:tc>
+                  <a:txBody>
+                    <a:bodyPr/>
+                    <a:lstStyle/>
+                    <a:p>
+                      <a:pPr algn="ctr"/>
+                      <a:r>
+                        <a:rPr lang="en-US" sz="2000" dirty="0" smtClean="0"/>
+                        <a:t>4</a:t>
+                      </a:r>
+                      <a:endParaRPr lang="en-US" sz="2000" dirty="0"/>
+                    </a:p>
+                  </a:txBody>
+                  <a:tcPr/>
+                </a:tc>
+                <a:tc>
+                  <a:txBody>
+                    <a:bodyPr/>
+                    <a:lstStyle/>
+                    <a:p>
+                      <a:pPr algn="ctr"/>
+                      <a:r>
+                        <a:rPr lang="en-US" sz="2000" dirty="0" smtClean="0"/>
+                        <a:t>85.67</a:t>
+                      </a:r>
+                      <a:endParaRPr lang="en-US" sz="2000" dirty="0"/>
+                    </a:p>
+                  </a:txBody>
+                  <a:tcPr/>
+                </a:tc>
+              </a:tr>
+              <a:tr h="370840">
+                <a:tc>
+                  <a:txBody>
+                    <a:bodyPr/>
+                    <a:lstStyle/>
+                    <a:p>
+                      <a:pPr algn="ctr"/>
+                      <a:r>
+                        <a:rPr lang="en-US" sz="2000" dirty="0" smtClean="0"/>
+                        <a:t>5</a:t>
+                      </a:r>
+                      <a:endParaRPr lang="en-US" sz="2000" dirty="0"/>
+                    </a:p>
+                  </a:txBody>
+                  <a:tcPr/>
+                </a:tc>
+                <a:tc>
+                  <a:txBody>
+                    <a:bodyPr/>
+                    <a:lstStyle/>
+                    <a:p>
+                      <a:pPr algn="ctr"/>
+                      <a:r>
+                        <a:rPr lang="en-US" sz="2000" dirty="0" smtClean="0"/>
+                        <a:t>94.54</a:t>
+                      </a:r>
+                      <a:endParaRPr lang="en-US" sz="2000" dirty="0"/>
+                    </a:p>
+                  </a:txBody>
+                  <a:tcPr/>
+                </a:tc>
+              </a:tr>
+              <a:tr h="370840">
+                <a:tc>
+                  <a:txBody>
+                    <a:bodyPr/>
+                    <a:lstStyle/>
+                    <a:p>
+                      <a:pPr algn="ctr"/>
+                      <a:r>
+                        <a:rPr lang="en-US" sz="2000" dirty="0" smtClean="0"/>
+                        <a:t>6</a:t>
+                      </a:r>
+                      <a:endParaRPr lang="en-US" sz="2000" dirty="0"/>
+                    </a:p>
+                  </a:txBody>
+                  <a:tcPr/>
+                </a:tc>
+                <a:tc>
+                  <a:txBody>
+                    <a:bodyPr/>
+                    <a:lstStyle/>
+                    <a:p>
+                      <a:pPr algn="ctr"/>
+                      <a:r>
+                        <a:rPr lang="en-US" sz="2000" dirty="0" smtClean="0"/>
+                        <a:t>97.27</a:t>
+                      </a:r>
+                      <a:endParaRPr lang="en-US" sz="2000" dirty="0"/>
+                    </a:p>
+                  </a:txBody>
+                  <a:tcPr/>
+                </a:tc>
+              </a:tr>
+            </a:tbl>
+          </a:graphicData>
+        </a:graphic>
+      </p:graphicFrame>
+      <p:pic>
+        <p:nvPicPr>
+          <p:cNvPr id="104" name="Picture 103" descr="words-options.JPG"/>
+          <p:cNvPicPr>
+            <a:picLocks noChangeAspect="1"/>
+          </p:cNvPicPr>
+          <p:nvPr/>
+        </p:nvPicPr>
+        <p:blipFill>
+          <a:blip r:embed="rId4">
+            <a:extLst>
+              <a:ext uri="{28A0092B-C50C-407E-A947-70E740481C1C}">
+                <a14:useLocalDpi xmlns:a14="http://schemas.microsoft.com/office/drawing/2010/main" val="0"/>
+              </a:ext>
+            </a:extLst>
+          </a:blip>
+          <a:stretch>
+            <a:fillRect/>
+          </a:stretch>
+        </p:blipFill>
+        <p:spPr>
+          <a:xfrm>
+            <a:off x="31134453" y="37274383"/>
+            <a:ext cx="10626224" cy="3268344"/>
+          </a:xfrm>
+          <a:prstGeom prst="rect">
+            <a:avLst/>
+          </a:prstGeom>
+        </p:spPr>
+      </p:pic>
+      <p:pic>
+        <p:nvPicPr>
+          <p:cNvPr id="105" name="Picture 104" descr="a_162.jpg"/>
+          <p:cNvPicPr>
+            <a:picLocks noChangeAspect="1"/>
+          </p:cNvPicPr>
+          <p:nvPr/>
+        </p:nvPicPr>
+        <p:blipFill>
+          <a:blip r:embed="rId5">
+            <a:extLst>
+              <a:ext uri="{28A0092B-C50C-407E-A947-70E740481C1C}">
+                <a14:useLocalDpi xmlns:a14="http://schemas.microsoft.com/office/drawing/2010/main" val="0"/>
+              </a:ext>
+            </a:extLst>
+          </a:blip>
+          <a:stretch>
+            <a:fillRect/>
+          </a:stretch>
+        </p:blipFill>
+        <p:spPr>
+          <a:xfrm>
+            <a:off x="4706641" y="27806095"/>
+            <a:ext cx="6096000" cy="6096000"/>
+          </a:xfrm>
+          <a:prstGeom prst="rect">
+            <a:avLst/>
+          </a:prstGeom>
+        </p:spPr>
+      </p:pic>
     </p:spTree>
     <p:extLst>
       <p:ext uri="{BB962C8B-B14F-4D97-AF65-F5344CB8AC3E}">

</xml_diff>

<commit_message>
second colum almost done
</commit_message>
<xml_diff>
--- a/poster/poster.pptx
+++ b/poster/poster.pptx
@@ -5105,7 +5105,7 @@
               <a:graphicData uri="http://schemas.openxmlformats.org/presentationml/2006/ole">
                 <mc:AlternateContent xmlns:mc="http://schemas.openxmlformats.org/markup-compatibility/2006">
                   <mc:Choice xmlns:v="urn:schemas-microsoft-com:vml" Requires="v">
-                    <p:oleObj spid="_x0000_s1099" name="Image" r:id="rId8" imgW="1828440" imgH="1117440" progId="Photoshop.Image.13">
+                    <p:oleObj spid="_x0000_s1111" name="Image" r:id="rId8" imgW="1828440" imgH="1117440" progId="Photoshop.Image.13">
                       <p:embed/>
                     </p:oleObj>
                   </mc:Choice>
@@ -5162,7 +5162,7 @@
               <a:graphicData uri="http://schemas.openxmlformats.org/presentationml/2006/ole">
                 <mc:AlternateContent xmlns:mc="http://schemas.openxmlformats.org/markup-compatibility/2006">
                   <mc:Choice xmlns:v="urn:schemas-microsoft-com:vml" Requires="v">
-                    <p:oleObj spid="_x0000_s1100" name="Image" r:id="rId10" imgW="1828440" imgH="1117440" progId="Photoshop.Image.13">
+                    <p:oleObj spid="_x0000_s1112" name="Image" r:id="rId10" imgW="1828440" imgH="1117440" progId="Photoshop.Image.13">
                       <p:embed/>
                     </p:oleObj>
                   </mc:Choice>
@@ -6312,7 +6312,7 @@
             <a:graphicData uri="http://schemas.openxmlformats.org/presentationml/2006/ole">
               <mc:AlternateContent xmlns:mc="http://schemas.openxmlformats.org/markup-compatibility/2006">
                 <mc:Choice xmlns:v="urn:schemas-microsoft-com:vml" Requires="v">
-                  <p:oleObj spid="_x0000_s1101" name="Image" r:id="rId12" imgW="4571280" imgH="1688760" progId="Photoshop.Image.13">
+                  <p:oleObj spid="_x0000_s1113" name="Image" r:id="rId12" imgW="4571280" imgH="1688760" progId="Photoshop.Image.13">
                     <p:embed/>
                   </p:oleObj>
                 </mc:Choice>
@@ -6396,7 +6396,7 @@
             <a:graphicData uri="http://schemas.openxmlformats.org/presentationml/2006/ole">
               <mc:AlternateContent xmlns:mc="http://schemas.openxmlformats.org/markup-compatibility/2006">
                 <mc:Choice xmlns:v="urn:schemas-microsoft-com:vml" Requires="v">
-                  <p:oleObj spid="_x0000_s1102" name="Image" r:id="rId15" imgW="1574280" imgH="1053720" progId="Photoshop.Image.13">
+                  <p:oleObj spid="_x0000_s1114" name="Image" r:id="rId15" imgW="1574280" imgH="1053720" progId="Photoshop.Image.13">
                     <p:embed/>
                   </p:oleObj>
                 </mc:Choice>
@@ -8610,7 +8610,7 @@
               <a:graphicData uri="http://schemas.openxmlformats.org/presentationml/2006/ole">
                 <mc:AlternateContent xmlns:mc="http://schemas.openxmlformats.org/markup-compatibility/2006">
                   <mc:Choice xmlns:v="urn:schemas-microsoft-com:vml" Requires="v">
-                    <p:oleObj spid="_x0000_s2123" name="Image" r:id="rId8" imgW="1828440" imgH="1117440" progId="Photoshop.Image.13">
+                    <p:oleObj spid="_x0000_s2135" name="Image" r:id="rId8" imgW="1828440" imgH="1117440" progId="Photoshop.Image.13">
                       <p:embed/>
                     </p:oleObj>
                   </mc:Choice>
@@ -8667,7 +8667,7 @@
               <a:graphicData uri="http://schemas.openxmlformats.org/presentationml/2006/ole">
                 <mc:AlternateContent xmlns:mc="http://schemas.openxmlformats.org/markup-compatibility/2006">
                   <mc:Choice xmlns:v="urn:schemas-microsoft-com:vml" Requires="v">
-                    <p:oleObj spid="_x0000_s2124" name="Image" r:id="rId10" imgW="1828440" imgH="1117440" progId="Photoshop.Image.13">
+                    <p:oleObj spid="_x0000_s2136" name="Image" r:id="rId10" imgW="1828440" imgH="1117440" progId="Photoshop.Image.13">
                       <p:embed/>
                     </p:oleObj>
                   </mc:Choice>
@@ -9817,7 +9817,7 @@
             <a:graphicData uri="http://schemas.openxmlformats.org/presentationml/2006/ole">
               <mc:AlternateContent xmlns:mc="http://schemas.openxmlformats.org/markup-compatibility/2006">
                 <mc:Choice xmlns:v="urn:schemas-microsoft-com:vml" Requires="v">
-                  <p:oleObj spid="_x0000_s2125" name="Image" r:id="rId12" imgW="4571280" imgH="1688760" progId="Photoshop.Image.13">
+                  <p:oleObj spid="_x0000_s2137" name="Image" r:id="rId12" imgW="4571280" imgH="1688760" progId="Photoshop.Image.13">
                     <p:embed/>
                   </p:oleObj>
                 </mc:Choice>
@@ -9901,7 +9901,7 @@
             <a:graphicData uri="http://schemas.openxmlformats.org/presentationml/2006/ole">
               <mc:AlternateContent xmlns:mc="http://schemas.openxmlformats.org/markup-compatibility/2006">
                 <mc:Choice xmlns:v="urn:schemas-microsoft-com:vml" Requires="v">
-                  <p:oleObj spid="_x0000_s2126" name="Image" r:id="rId15" imgW="1574280" imgH="1053720" progId="Photoshop.Image.13">
+                  <p:oleObj spid="_x0000_s2138" name="Image" r:id="rId15" imgW="1574280" imgH="1053720" progId="Photoshop.Image.13">
                     <p:embed/>
                   </p:oleObj>
                 </mc:Choice>
@@ -12000,7 +12000,7 @@
               <a:graphicData uri="http://schemas.openxmlformats.org/presentationml/2006/ole">
                 <mc:AlternateContent xmlns:mc="http://schemas.openxmlformats.org/markup-compatibility/2006">
                   <mc:Choice xmlns:v="urn:schemas-microsoft-com:vml" Requires="v">
-                    <p:oleObj spid="_x0000_s3147" name="Image" r:id="rId8" imgW="1828440" imgH="1117440" progId="Photoshop.Image.13">
+                    <p:oleObj spid="_x0000_s3159" name="Image" r:id="rId8" imgW="1828440" imgH="1117440" progId="Photoshop.Image.13">
                       <p:embed/>
                     </p:oleObj>
                   </mc:Choice>
@@ -12057,7 +12057,7 @@
               <a:graphicData uri="http://schemas.openxmlformats.org/presentationml/2006/ole">
                 <mc:AlternateContent xmlns:mc="http://schemas.openxmlformats.org/markup-compatibility/2006">
                   <mc:Choice xmlns:v="urn:schemas-microsoft-com:vml" Requires="v">
-                    <p:oleObj spid="_x0000_s3148" name="Image" r:id="rId10" imgW="1828440" imgH="1117440" progId="Photoshop.Image.13">
+                    <p:oleObj spid="_x0000_s3160" name="Image" r:id="rId10" imgW="1828440" imgH="1117440" progId="Photoshop.Image.13">
                       <p:embed/>
                     </p:oleObj>
                   </mc:Choice>
@@ -13207,7 +13207,7 @@
             <a:graphicData uri="http://schemas.openxmlformats.org/presentationml/2006/ole">
               <mc:AlternateContent xmlns:mc="http://schemas.openxmlformats.org/markup-compatibility/2006">
                 <mc:Choice xmlns:v="urn:schemas-microsoft-com:vml" Requires="v">
-                  <p:oleObj spid="_x0000_s3149" name="Image" r:id="rId12" imgW="4571280" imgH="1688760" progId="Photoshop.Image.13">
+                  <p:oleObj spid="_x0000_s3161" name="Image" r:id="rId12" imgW="4571280" imgH="1688760" progId="Photoshop.Image.13">
                     <p:embed/>
                   </p:oleObj>
                 </mc:Choice>
@@ -13291,7 +13291,7 @@
             <a:graphicData uri="http://schemas.openxmlformats.org/presentationml/2006/ole">
               <mc:AlternateContent xmlns:mc="http://schemas.openxmlformats.org/markup-compatibility/2006">
                 <mc:Choice xmlns:v="urn:schemas-microsoft-com:vml" Requires="v">
-                  <p:oleObj spid="_x0000_s3150" name="Image" r:id="rId15" imgW="1574280" imgH="1053720" progId="Photoshop.Image.13">
+                  <p:oleObj spid="_x0000_s3162" name="Image" r:id="rId15" imgW="1574280" imgH="1053720" progId="Photoshop.Image.13">
                     <p:embed/>
                   </p:oleObj>
                 </mc:Choice>
@@ -14176,31 +14176,24 @@
             <p:ph type="body" sz="quarter" idx="21"/>
           </p:nvPr>
         </p:nvSpPr>
-        <p:spPr/>
+        <p:spPr>
+          <a:xfrm>
+            <a:off x="15183522" y="31564001"/>
+            <a:ext cx="13571534" cy="964344"/>
+          </a:xfrm>
+        </p:spPr>
         <p:txBody>
           <a:bodyPr/>
           <a:lstStyle/>
           <a:p>
-            <a:endParaRPr lang="en-US"/>
-          </a:p>
-        </p:txBody>
-      </p:sp>
-      <p:sp>
-        <p:nvSpPr>
-          <p:cNvPr id="358" name="Text Placeholder 357"/>
-          <p:cNvSpPr>
-            <a:spLocks noGrp="1"/>
-          </p:cNvSpPr>
-          <p:nvPr>
-            <p:ph type="body" sz="quarter" idx="22"/>
-          </p:nvPr>
-        </p:nvSpPr>
-        <p:spPr/>
-        <p:txBody>
-          <a:bodyPr/>
-          <a:lstStyle/>
-          <a:p>
-            <a:endParaRPr lang="en-US"/>
+            <a:pPr marL="457200" indent="-457200">
+              <a:lnSpc>
+                <a:spcPct val="120000"/>
+              </a:lnSpc>
+              <a:buFont typeface="Arial"/>
+              <a:buChar char="•"/>
+            </a:pPr>
+            <a:endParaRPr lang="en-US" sz="2800" dirty="0"/>
           </a:p>
         </p:txBody>
       </p:sp>
@@ -14214,12 +14207,66 @@
             <p:ph type="body" sz="quarter" idx="23"/>
           </p:nvPr>
         </p:nvSpPr>
-        <p:spPr/>
+        <p:spPr>
+          <a:xfrm>
+            <a:off x="15162215" y="7787858"/>
+            <a:ext cx="13571534" cy="2628390"/>
+          </a:xfrm>
+        </p:spPr>
         <p:txBody>
           <a:bodyPr/>
           <a:lstStyle/>
           <a:p>
-            <a:endParaRPr lang="en-US" dirty="0"/>
+            <a:pPr marL="342900" indent="-342900">
+              <a:buFont typeface="Arial"/>
+              <a:buChar char="•"/>
+            </a:pPr>
+            <a:r>
+              <a:rPr lang="en-US" sz="2800" dirty="0" smtClean="0"/>
+              <a:t>Features extracted</a:t>
+            </a:r>
+          </a:p>
+          <a:p>
+            <a:pPr marL="1828725" lvl="1" indent="-342900">
+              <a:buFont typeface="Arial"/>
+              <a:buChar char="•"/>
+            </a:pPr>
+            <a:r>
+              <a:rPr lang="en-US" sz="2800" dirty="0"/>
+              <a:t>m</a:t>
+            </a:r>
+            <a:r>
+              <a:rPr lang="en-US" sz="2800" dirty="0" smtClean="0"/>
+              <a:t>ean, rms, skewness, kurtosis, variance, min, max</a:t>
+            </a:r>
+          </a:p>
+          <a:p>
+            <a:pPr marL="1828725" lvl="1" indent="-342900">
+              <a:buFont typeface="Arial"/>
+              <a:buChar char="•"/>
+            </a:pPr>
+            <a:r>
+              <a:rPr lang="en-US" sz="2800" dirty="0" smtClean="0"/>
+              <a:t>Fast Fourier Transformation coefficients (30) </a:t>
+            </a:r>
+          </a:p>
+          <a:p>
+            <a:pPr marL="1828725" lvl="1" indent="-342900">
+              <a:buFont typeface="Arial"/>
+              <a:buChar char="•"/>
+            </a:pPr>
+            <a:endParaRPr lang="en-US" sz="1000" dirty="0" smtClean="0"/>
+          </a:p>
+          <a:p>
+            <a:pPr marL="342900" indent="-342900">
+              <a:buFont typeface="Arial"/>
+              <a:buChar char="•"/>
+            </a:pPr>
+            <a:r>
+              <a:rPr lang="en-US" sz="2800" dirty="0" smtClean="0"/>
+              <a:t>Classifier used: AdaBoost with Decision Stump as weak learner</a:t>
+            </a:r>
+            <a:endParaRPr lang="en-US" sz="2800" dirty="0"/>
           </a:p>
         </p:txBody>
       </p:sp>
@@ -16281,7 +16328,7 @@
         </p:nvGrpSpPr>
         <p:grpSpPr>
           <a:xfrm>
-            <a:off x="16335476" y="32436510"/>
+            <a:off x="15990141" y="26165440"/>
             <a:ext cx="11639652" cy="5152511"/>
             <a:chOff x="17171601" y="33011758"/>
             <a:chExt cx="9029436" cy="3078322"/>
@@ -18311,7 +18358,7 @@
         </p:blipFill>
         <p:spPr>
           <a:xfrm>
-            <a:off x="31134453" y="37274383"/>
+            <a:off x="16547075" y="34852924"/>
             <a:ext cx="10626224" cy="3268344"/>
           </a:xfrm>
           <a:prstGeom prst="rect">
@@ -19383,6 +19430,263 @@
             <a:r>
               <a:rPr lang="en-US" sz="2800" dirty="0" smtClean="0"/>
               <a:t>Clipper module removes the beginning and ending noise</a:t>
+            </a:r>
+          </a:p>
+        </p:txBody>
+      </p:sp>
+      <p:sp>
+        <p:nvSpPr>
+          <p:cNvPr id="171" name="Text Placeholder 358"/>
+          <p:cNvSpPr txBox="1">
+            <a:spLocks/>
+          </p:cNvSpPr>
+          <p:nvPr/>
+        </p:nvSpPr>
+        <p:spPr>
+          <a:xfrm>
+            <a:off x="15238762" y="21187984"/>
+            <a:ext cx="13571534" cy="5029047"/>
+          </a:xfrm>
+          <a:prstGeom prst="rect">
+            <a:avLst/>
+          </a:prstGeom>
+        </p:spPr>
+        <p:txBody>
+          <a:bodyPr wrap="square" lIns="228589" tIns="228589" rIns="228589" bIns="228589">
+            <a:spAutoFit/>
+          </a:bodyPr>
+          <a:lstStyle>
+            <a:lvl1pPr marL="0" indent="0" algn="l" defTabSz="4388900" rtl="0" eaLnBrk="1" latinLnBrk="0" hangingPunct="1">
+              <a:spcBef>
+                <a:spcPct val="20000"/>
+              </a:spcBef>
+              <a:buFont typeface="Arial" pitchFamily="34" charset="0"/>
+              <a:buNone/>
+              <a:defRPr sz="2500" kern="1200">
+                <a:solidFill>
+                  <a:schemeClr val="accent5">
+                    <a:lumMod val="50000"/>
+                  </a:schemeClr>
+                </a:solidFill>
+                <a:latin typeface="Trebuchet MS" pitchFamily="34" charset="0"/>
+                <a:ea typeface="+mn-ea"/>
+                <a:cs typeface="+mn-cs"/>
+              </a:defRPr>
+            </a:lvl1pPr>
+            <a:lvl2pPr marL="1485825" indent="-571471" algn="l" defTabSz="4388900" rtl="0" eaLnBrk="1" latinLnBrk="0" hangingPunct="1">
+              <a:spcBef>
+                <a:spcPct val="20000"/>
+              </a:spcBef>
+              <a:buFont typeface="Arial" pitchFamily="34" charset="0"/>
+              <a:buChar char="–"/>
+              <a:defRPr sz="2500" kern="1200">
+                <a:solidFill>
+                  <a:schemeClr val="tx1"/>
+                </a:solidFill>
+                <a:latin typeface="Trebuchet MS" pitchFamily="34" charset="0"/>
+                <a:ea typeface="+mn-ea"/>
+                <a:cs typeface="+mn-cs"/>
+              </a:defRPr>
+            </a:lvl2pPr>
+            <a:lvl3pPr marL="2057297" indent="-571471" algn="l" defTabSz="4388900" rtl="0" eaLnBrk="1" latinLnBrk="0" hangingPunct="1">
+              <a:spcBef>
+                <a:spcPct val="20000"/>
+              </a:spcBef>
+              <a:buFont typeface="Arial" pitchFamily="34" charset="0"/>
+              <a:buChar char="•"/>
+              <a:defRPr sz="2500" kern="1200">
+                <a:solidFill>
+                  <a:schemeClr val="tx1"/>
+                </a:solidFill>
+                <a:latin typeface="Trebuchet MS" pitchFamily="34" charset="0"/>
+                <a:ea typeface="+mn-ea"/>
+                <a:cs typeface="+mn-cs"/>
+              </a:defRPr>
+            </a:lvl3pPr>
+            <a:lvl4pPr marL="2685916" indent="-628619" algn="l" defTabSz="4388900" rtl="0" eaLnBrk="1" latinLnBrk="0" hangingPunct="1">
+              <a:spcBef>
+                <a:spcPct val="20000"/>
+              </a:spcBef>
+              <a:buFont typeface="Arial" pitchFamily="34" charset="0"/>
+              <a:buChar char="–"/>
+              <a:defRPr sz="2500" kern="1200">
+                <a:solidFill>
+                  <a:schemeClr val="tx1"/>
+                </a:solidFill>
+                <a:latin typeface="Trebuchet MS" pitchFamily="34" charset="0"/>
+                <a:ea typeface="+mn-ea"/>
+                <a:cs typeface="+mn-cs"/>
+              </a:defRPr>
+            </a:lvl4pPr>
+            <a:lvl5pPr marL="3143093" indent="-457177" algn="l" defTabSz="4388900" rtl="0" eaLnBrk="1" latinLnBrk="0" hangingPunct="1">
+              <a:spcBef>
+                <a:spcPct val="20000"/>
+              </a:spcBef>
+              <a:buFont typeface="Arial" pitchFamily="34" charset="0"/>
+              <a:buChar char="»"/>
+              <a:defRPr sz="2500" kern="1200">
+                <a:solidFill>
+                  <a:schemeClr val="tx1"/>
+                </a:solidFill>
+                <a:latin typeface="Trebuchet MS" pitchFamily="34" charset="0"/>
+                <a:ea typeface="+mn-ea"/>
+                <a:cs typeface="+mn-cs"/>
+              </a:defRPr>
+            </a:lvl5pPr>
+            <a:lvl6pPr marL="12069477" indent="-1097226" algn="l" defTabSz="4388900" rtl="0" eaLnBrk="1" latinLnBrk="0" hangingPunct="1">
+              <a:spcBef>
+                <a:spcPct val="20000"/>
+              </a:spcBef>
+              <a:buFont typeface="Arial" pitchFamily="34" charset="0"/>
+              <a:buChar char="•"/>
+              <a:defRPr sz="9600" kern="1200">
+                <a:solidFill>
+                  <a:schemeClr val="tx1"/>
+                </a:solidFill>
+                <a:latin typeface="+mn-lt"/>
+                <a:ea typeface="+mn-ea"/>
+                <a:cs typeface="+mn-cs"/>
+              </a:defRPr>
+            </a:lvl6pPr>
+            <a:lvl7pPr marL="14263926" indent="-1097226" algn="l" defTabSz="4388900" rtl="0" eaLnBrk="1" latinLnBrk="0" hangingPunct="1">
+              <a:spcBef>
+                <a:spcPct val="20000"/>
+              </a:spcBef>
+              <a:buFont typeface="Arial" pitchFamily="34" charset="0"/>
+              <a:buChar char="•"/>
+              <a:defRPr sz="9600" kern="1200">
+                <a:solidFill>
+                  <a:schemeClr val="tx1"/>
+                </a:solidFill>
+                <a:latin typeface="+mn-lt"/>
+                <a:ea typeface="+mn-ea"/>
+                <a:cs typeface="+mn-cs"/>
+              </a:defRPr>
+            </a:lvl7pPr>
+            <a:lvl8pPr marL="16458377" indent="-1097226" algn="l" defTabSz="4388900" rtl="0" eaLnBrk="1" latinLnBrk="0" hangingPunct="1">
+              <a:spcBef>
+                <a:spcPct val="20000"/>
+              </a:spcBef>
+              <a:buFont typeface="Arial" pitchFamily="34" charset="0"/>
+              <a:buChar char="•"/>
+              <a:defRPr sz="9600" kern="1200">
+                <a:solidFill>
+                  <a:schemeClr val="tx1"/>
+                </a:solidFill>
+                <a:latin typeface="+mn-lt"/>
+                <a:ea typeface="+mn-ea"/>
+                <a:cs typeface="+mn-cs"/>
+              </a:defRPr>
+            </a:lvl8pPr>
+            <a:lvl9pPr marL="18652827" indent="-1097226" algn="l" defTabSz="4388900" rtl="0" eaLnBrk="1" latinLnBrk="0" hangingPunct="1">
+              <a:spcBef>
+                <a:spcPct val="20000"/>
+              </a:spcBef>
+              <a:buFont typeface="Arial" pitchFamily="34" charset="0"/>
+              <a:buChar char="•"/>
+              <a:defRPr sz="9600" kern="1200">
+                <a:solidFill>
+                  <a:schemeClr val="tx1"/>
+                </a:solidFill>
+                <a:latin typeface="+mn-lt"/>
+                <a:ea typeface="+mn-ea"/>
+                <a:cs typeface="+mn-cs"/>
+              </a:defRPr>
+            </a:lvl9pPr>
+          </a:lstStyle>
+          <a:p>
+            <a:pPr marL="342900" indent="-342900">
+              <a:lnSpc>
+                <a:spcPct val="120000"/>
+              </a:lnSpc>
+              <a:buFont typeface="Arial"/>
+              <a:buChar char="•"/>
+            </a:pPr>
+            <a:r>
+              <a:rPr lang="en-US" sz="2800" dirty="0" smtClean="0"/>
+              <a:t>SignalBreaker module breaks the word signal into individual letters</a:t>
+            </a:r>
+          </a:p>
+          <a:p>
+            <a:pPr marL="342900" indent="-342900">
+              <a:lnSpc>
+                <a:spcPct val="120000"/>
+              </a:lnSpc>
+              <a:buFont typeface="Arial"/>
+              <a:buChar char="•"/>
+            </a:pPr>
+            <a:r>
+              <a:rPr lang="en-US" sz="2800" dirty="0" smtClean="0"/>
+              <a:t>Predictions made by the classifier are matched against a dictionary</a:t>
+            </a:r>
+          </a:p>
+          <a:p>
+            <a:pPr marL="1828725" lvl="1" indent="-342900">
+              <a:lnSpc>
+                <a:spcPct val="120000"/>
+              </a:lnSpc>
+              <a:buFont typeface="Arial"/>
+              <a:buChar char="•"/>
+            </a:pPr>
+            <a:r>
+              <a:rPr lang="en-US" sz="2800" dirty="0" smtClean="0"/>
+              <a:t>Used Harvard sentences as the candidate dictionary</a:t>
+            </a:r>
+          </a:p>
+          <a:p>
+            <a:pPr marL="1828725" lvl="1" indent="-342900">
+              <a:lnSpc>
+                <a:spcPct val="120000"/>
+              </a:lnSpc>
+              <a:buFont typeface="Arial"/>
+              <a:buChar char="•"/>
+            </a:pPr>
+            <a:r>
+              <a:rPr lang="en-US" sz="2800" dirty="0" smtClean="0"/>
+              <a:t>Labeled dictionary using L/R and U/D labels</a:t>
+            </a:r>
+          </a:p>
+          <a:p>
+            <a:pPr marL="1828725" lvl="1" indent="-342900">
+              <a:lnSpc>
+                <a:spcPct val="120000"/>
+              </a:lnSpc>
+              <a:buFont typeface="Arial"/>
+              <a:buChar char="•"/>
+            </a:pPr>
+            <a:r>
+              <a:rPr lang="en-US" sz="2800" dirty="0" smtClean="0"/>
+              <a:t>Hamming distance with each dictionary word is computed</a:t>
+            </a:r>
+          </a:p>
+          <a:p>
+            <a:pPr marL="1828725" lvl="1" indent="-342900">
+              <a:lnSpc>
+                <a:spcPct val="120000"/>
+              </a:lnSpc>
+              <a:buFont typeface="Arial"/>
+              <a:buChar char="•"/>
+            </a:pPr>
+            <a:r>
+              <a:rPr lang="en-US" sz="2800" dirty="0" smtClean="0"/>
+              <a:t>Output dictionary words with lowest Hamming distance</a:t>
+            </a:r>
+          </a:p>
+          <a:p>
+            <a:pPr marL="1828725" lvl="1" indent="-342900">
+              <a:buFont typeface="Arial"/>
+              <a:buChar char="•"/>
+            </a:pPr>
+            <a:endParaRPr lang="en-US" sz="2800" dirty="0" smtClean="0"/>
+          </a:p>
+          <a:p>
+            <a:pPr marL="342900" indent="-342900">
+              <a:buFont typeface="Arial"/>
+              <a:buChar char="•"/>
+            </a:pPr>
+            <a:r>
+              <a:rPr lang="en-US" sz="2800" dirty="0" smtClean="0"/>
+              <a:t>Example</a:t>
             </a:r>
           </a:p>
         </p:txBody>

</xml_diff>

<commit_message>
all three columns done
</commit_message>
<xml_diff>
--- a/poster/poster.pptx
+++ b/poster/poster.pptx
@@ -5105,7 +5105,7 @@
               <a:graphicData uri="http://schemas.openxmlformats.org/presentationml/2006/ole">
                 <mc:AlternateContent xmlns:mc="http://schemas.openxmlformats.org/markup-compatibility/2006">
                   <mc:Choice xmlns:v="urn:schemas-microsoft-com:vml" Requires="v">
-                    <p:oleObj spid="_x0000_s1111" name="Image" r:id="rId8" imgW="1828440" imgH="1117440" progId="Photoshop.Image.13">
+                    <p:oleObj spid="_x0000_s1147" name="Image" r:id="rId8" imgW="1828440" imgH="1117440" progId="Photoshop.Image.13">
                       <p:embed/>
                     </p:oleObj>
                   </mc:Choice>
@@ -5162,7 +5162,7 @@
               <a:graphicData uri="http://schemas.openxmlformats.org/presentationml/2006/ole">
                 <mc:AlternateContent xmlns:mc="http://schemas.openxmlformats.org/markup-compatibility/2006">
                   <mc:Choice xmlns:v="urn:schemas-microsoft-com:vml" Requires="v">
-                    <p:oleObj spid="_x0000_s1112" name="Image" r:id="rId10" imgW="1828440" imgH="1117440" progId="Photoshop.Image.13">
+                    <p:oleObj spid="_x0000_s1148" name="Image" r:id="rId10" imgW="1828440" imgH="1117440" progId="Photoshop.Image.13">
                       <p:embed/>
                     </p:oleObj>
                   </mc:Choice>
@@ -6312,7 +6312,7 @@
             <a:graphicData uri="http://schemas.openxmlformats.org/presentationml/2006/ole">
               <mc:AlternateContent xmlns:mc="http://schemas.openxmlformats.org/markup-compatibility/2006">
                 <mc:Choice xmlns:v="urn:schemas-microsoft-com:vml" Requires="v">
-                  <p:oleObj spid="_x0000_s1113" name="Image" r:id="rId12" imgW="4571280" imgH="1688760" progId="Photoshop.Image.13">
+                  <p:oleObj spid="_x0000_s1149" name="Image" r:id="rId12" imgW="4571280" imgH="1688760" progId="Photoshop.Image.13">
                     <p:embed/>
                   </p:oleObj>
                 </mc:Choice>
@@ -6396,7 +6396,7 @@
             <a:graphicData uri="http://schemas.openxmlformats.org/presentationml/2006/ole">
               <mc:AlternateContent xmlns:mc="http://schemas.openxmlformats.org/markup-compatibility/2006">
                 <mc:Choice xmlns:v="urn:schemas-microsoft-com:vml" Requires="v">
-                  <p:oleObj spid="_x0000_s1114" name="Image" r:id="rId15" imgW="1574280" imgH="1053720" progId="Photoshop.Image.13">
+                  <p:oleObj spid="_x0000_s1150" name="Image" r:id="rId15" imgW="1574280" imgH="1053720" progId="Photoshop.Image.13">
                     <p:embed/>
                   </p:oleObj>
                 </mc:Choice>
@@ -8610,7 +8610,7 @@
               <a:graphicData uri="http://schemas.openxmlformats.org/presentationml/2006/ole">
                 <mc:AlternateContent xmlns:mc="http://schemas.openxmlformats.org/markup-compatibility/2006">
                   <mc:Choice xmlns:v="urn:schemas-microsoft-com:vml" Requires="v">
-                    <p:oleObj spid="_x0000_s2135" name="Image" r:id="rId8" imgW="1828440" imgH="1117440" progId="Photoshop.Image.13">
+                    <p:oleObj spid="_x0000_s2171" name="Image" r:id="rId8" imgW="1828440" imgH="1117440" progId="Photoshop.Image.13">
                       <p:embed/>
                     </p:oleObj>
                   </mc:Choice>
@@ -8667,7 +8667,7 @@
               <a:graphicData uri="http://schemas.openxmlformats.org/presentationml/2006/ole">
                 <mc:AlternateContent xmlns:mc="http://schemas.openxmlformats.org/markup-compatibility/2006">
                   <mc:Choice xmlns:v="urn:schemas-microsoft-com:vml" Requires="v">
-                    <p:oleObj spid="_x0000_s2136" name="Image" r:id="rId10" imgW="1828440" imgH="1117440" progId="Photoshop.Image.13">
+                    <p:oleObj spid="_x0000_s2172" name="Image" r:id="rId10" imgW="1828440" imgH="1117440" progId="Photoshop.Image.13">
                       <p:embed/>
                     </p:oleObj>
                   </mc:Choice>
@@ -9817,7 +9817,7 @@
             <a:graphicData uri="http://schemas.openxmlformats.org/presentationml/2006/ole">
               <mc:AlternateContent xmlns:mc="http://schemas.openxmlformats.org/markup-compatibility/2006">
                 <mc:Choice xmlns:v="urn:schemas-microsoft-com:vml" Requires="v">
-                  <p:oleObj spid="_x0000_s2137" name="Image" r:id="rId12" imgW="4571280" imgH="1688760" progId="Photoshop.Image.13">
+                  <p:oleObj spid="_x0000_s2173" name="Image" r:id="rId12" imgW="4571280" imgH="1688760" progId="Photoshop.Image.13">
                     <p:embed/>
                   </p:oleObj>
                 </mc:Choice>
@@ -9901,7 +9901,7 @@
             <a:graphicData uri="http://schemas.openxmlformats.org/presentationml/2006/ole">
               <mc:AlternateContent xmlns:mc="http://schemas.openxmlformats.org/markup-compatibility/2006">
                 <mc:Choice xmlns:v="urn:schemas-microsoft-com:vml" Requires="v">
-                  <p:oleObj spid="_x0000_s2138" name="Image" r:id="rId15" imgW="1574280" imgH="1053720" progId="Photoshop.Image.13">
+                  <p:oleObj spid="_x0000_s2174" name="Image" r:id="rId15" imgW="1574280" imgH="1053720" progId="Photoshop.Image.13">
                     <p:embed/>
                   </p:oleObj>
                 </mc:Choice>
@@ -12000,7 +12000,7 @@
               <a:graphicData uri="http://schemas.openxmlformats.org/presentationml/2006/ole">
                 <mc:AlternateContent xmlns:mc="http://schemas.openxmlformats.org/markup-compatibility/2006">
                   <mc:Choice xmlns:v="urn:schemas-microsoft-com:vml" Requires="v">
-                    <p:oleObj spid="_x0000_s3159" name="Image" r:id="rId8" imgW="1828440" imgH="1117440" progId="Photoshop.Image.13">
+                    <p:oleObj spid="_x0000_s3195" name="Image" r:id="rId8" imgW="1828440" imgH="1117440" progId="Photoshop.Image.13">
                       <p:embed/>
                     </p:oleObj>
                   </mc:Choice>
@@ -12057,7 +12057,7 @@
               <a:graphicData uri="http://schemas.openxmlformats.org/presentationml/2006/ole">
                 <mc:AlternateContent xmlns:mc="http://schemas.openxmlformats.org/markup-compatibility/2006">
                   <mc:Choice xmlns:v="urn:schemas-microsoft-com:vml" Requires="v">
-                    <p:oleObj spid="_x0000_s3160" name="Image" r:id="rId10" imgW="1828440" imgH="1117440" progId="Photoshop.Image.13">
+                    <p:oleObj spid="_x0000_s3196" name="Image" r:id="rId10" imgW="1828440" imgH="1117440" progId="Photoshop.Image.13">
                       <p:embed/>
                     </p:oleObj>
                   </mc:Choice>
@@ -13207,7 +13207,7 @@
             <a:graphicData uri="http://schemas.openxmlformats.org/presentationml/2006/ole">
               <mc:AlternateContent xmlns:mc="http://schemas.openxmlformats.org/markup-compatibility/2006">
                 <mc:Choice xmlns:v="urn:schemas-microsoft-com:vml" Requires="v">
-                  <p:oleObj spid="_x0000_s3161" name="Image" r:id="rId12" imgW="4571280" imgH="1688760" progId="Photoshop.Image.13">
+                  <p:oleObj spid="_x0000_s3197" name="Image" r:id="rId12" imgW="4571280" imgH="1688760" progId="Photoshop.Image.13">
                     <p:embed/>
                   </p:oleObj>
                 </mc:Choice>
@@ -13291,7 +13291,7 @@
             <a:graphicData uri="http://schemas.openxmlformats.org/presentationml/2006/ole">
               <mc:AlternateContent xmlns:mc="http://schemas.openxmlformats.org/markup-compatibility/2006">
                 <mc:Choice xmlns:v="urn:schemas-microsoft-com:vml" Requires="v">
-                  <p:oleObj spid="_x0000_s3162" name="Image" r:id="rId15" imgW="1574280" imgH="1053720" progId="Photoshop.Image.13">
+                  <p:oleObj spid="_x0000_s3198" name="Image" r:id="rId15" imgW="1574280" imgH="1053720" progId="Photoshop.Image.13">
                     <p:embed/>
                   </p:oleObj>
                 </mc:Choice>
@@ -14178,8 +14178,8 @@
         </p:nvSpPr>
         <p:spPr>
           <a:xfrm>
-            <a:off x="15183522" y="31564001"/>
-            <a:ext cx="13571534" cy="964344"/>
+            <a:off x="15183522" y="33054887"/>
+            <a:ext cx="13571534" cy="3980555"/>
           </a:xfrm>
         </p:spPr>
         <p:txBody>
@@ -14193,6 +14193,82 @@
               <a:buFont typeface="Arial"/>
               <a:buChar char="•"/>
             </a:pPr>
+            <a:r>
+              <a:rPr lang="en-US" sz="2800" dirty="0" smtClean="0"/>
+              <a:t>Input: A sentence from the Harvard dictionary</a:t>
+            </a:r>
+          </a:p>
+          <a:p>
+            <a:pPr marL="457200" indent="-457200">
+              <a:lnSpc>
+                <a:spcPct val="120000"/>
+              </a:lnSpc>
+              <a:buFont typeface="Arial"/>
+              <a:buChar char="•"/>
+            </a:pPr>
+            <a:r>
+              <a:rPr lang="en-US" sz="2800" dirty="0" smtClean="0"/>
+              <a:t>Output: All candidate words that constitute this sentence</a:t>
+            </a:r>
+          </a:p>
+          <a:p>
+            <a:pPr marL="1943025" lvl="1" indent="-457200">
+              <a:lnSpc>
+                <a:spcPct val="120000"/>
+              </a:lnSpc>
+              <a:buFont typeface="Arial"/>
+              <a:buChar char="•"/>
+            </a:pPr>
+            <a:r>
+              <a:rPr lang="en-US" sz="2800" dirty="0" smtClean="0"/>
+              <a:t>Exact matches are shown without other candidates</a:t>
+            </a:r>
+          </a:p>
+          <a:p>
+            <a:pPr marL="1943025" lvl="1" indent="-457200">
+              <a:lnSpc>
+                <a:spcPct val="120000"/>
+              </a:lnSpc>
+              <a:buFont typeface="Arial"/>
+              <a:buChar char="•"/>
+            </a:pPr>
+            <a:r>
+              <a:rPr lang="en-US" sz="2800" dirty="0" smtClean="0"/>
+              <a:t>Partial matches shown with lowest Hamming distanced words</a:t>
+            </a:r>
+          </a:p>
+          <a:p>
+            <a:pPr marL="457200" indent="-457200">
+              <a:lnSpc>
+                <a:spcPct val="120000"/>
+              </a:lnSpc>
+              <a:buFont typeface="Arial"/>
+              <a:buChar char="•"/>
+            </a:pPr>
+            <a:r>
+              <a:rPr lang="en-US" sz="2800" dirty="0" smtClean="0"/>
+              <a:t>EavesDroid is able to recover 1-3 lettered words (such as ‘box’, ‘key’, ‘in’) while </a:t>
+            </a:r>
+            <a:r>
+              <a:rPr lang="en-US" sz="2800" dirty="0"/>
+              <a:t>Marquardt </a:t>
+            </a:r>
+            <a:r>
+              <a:rPr lang="en-US" sz="2800" i="1" dirty="0"/>
+              <a:t>et. </a:t>
+            </a:r>
+            <a:r>
+              <a:rPr lang="en-US" sz="2800" i="1" dirty="0" smtClean="0"/>
+              <a:t>al </a:t>
+            </a:r>
+            <a:r>
+              <a:rPr lang="en-US" sz="2800" dirty="0" smtClean="0"/>
+              <a:t>work </a:t>
+            </a:r>
+            <a:r>
+              <a:rPr lang="en-US" sz="2800" dirty="0" smtClean="0"/>
+              <a:t>relies on human identification</a:t>
+            </a:r>
             <a:endParaRPr lang="en-US" sz="2800" dirty="0"/>
           </a:p>
         </p:txBody>
@@ -14308,7 +14384,11 @@
           <a:bodyPr/>
           <a:lstStyle/>
           <a:p>
-            <a:endParaRPr lang="en-US"/>
+            <a:r>
+              <a:rPr lang="en-US" dirty="0" smtClean="0"/>
+              <a:t>Experimentation</a:t>
+            </a:r>
+            <a:endParaRPr lang="en-US" dirty="0"/>
           </a:p>
         </p:txBody>
       </p:sp>
@@ -14322,50 +14402,60 @@
             <p:ph type="body" sz="quarter" idx="26"/>
           </p:nvPr>
         </p:nvSpPr>
-        <p:spPr/>
+        <p:spPr>
+          <a:xfrm>
+            <a:off x="29395742" y="7777274"/>
+            <a:ext cx="13576029" cy="2601715"/>
+          </a:xfrm>
+        </p:spPr>
         <p:txBody>
           <a:bodyPr/>
           <a:lstStyle/>
           <a:p>
-            <a:endParaRPr lang="en-US"/>
+            <a:pPr marL="457200" indent="-457200">
+              <a:lnSpc>
+                <a:spcPct val="120000"/>
+              </a:lnSpc>
+              <a:buFont typeface="Arial"/>
+              <a:buChar char="•"/>
+            </a:pPr>
+            <a:r>
+              <a:rPr lang="en-US" sz="2800" dirty="0" smtClean="0"/>
+              <a:t>AdaBoost + Decision Stump achieves comparable accuracy with AdaBoost + Random Forests and </a:t>
+            </a:r>
+            <a:r>
+              <a:rPr lang="en-US" sz="2800" dirty="0"/>
+              <a:t>N</a:t>
+            </a:r>
+            <a:r>
+              <a:rPr lang="en-US" sz="2800" dirty="0" smtClean="0"/>
+              <a:t>eural </a:t>
+            </a:r>
+            <a:r>
+              <a:rPr lang="en-US" sz="2800" dirty="0" smtClean="0"/>
+              <a:t>N</a:t>
+            </a:r>
+            <a:r>
+              <a:rPr lang="en-US" sz="2800" dirty="0" smtClean="0"/>
+              <a:t>etworks.</a:t>
+            </a:r>
           </a:p>
-        </p:txBody>
-      </p:sp>
-      <p:sp>
-        <p:nvSpPr>
-          <p:cNvPr id="363" name="Text Placeholder 362"/>
-          <p:cNvSpPr>
-            <a:spLocks noGrp="1"/>
-          </p:cNvSpPr>
-          <p:nvPr>
-            <p:ph type="body" sz="quarter" idx="27"/>
-          </p:nvPr>
-        </p:nvSpPr>
-        <p:spPr/>
-        <p:txBody>
-          <a:bodyPr/>
-          <a:lstStyle/>
           <a:p>
-            <a:endParaRPr lang="en-US"/>
-          </a:p>
-        </p:txBody>
-      </p:sp>
-      <p:sp>
-        <p:nvSpPr>
-          <p:cNvPr id="364" name="Text Placeholder 363"/>
-          <p:cNvSpPr>
-            <a:spLocks noGrp="1"/>
-          </p:cNvSpPr>
-          <p:nvPr>
-            <p:ph type="body" sz="quarter" idx="28"/>
-          </p:nvPr>
-        </p:nvSpPr>
-        <p:spPr/>
-        <p:txBody>
-          <a:bodyPr/>
-          <a:lstStyle/>
-          <a:p>
-            <a:endParaRPr lang="en-US"/>
+            <a:pPr marL="457200" indent="-457200">
+              <a:lnSpc>
+                <a:spcPct val="120000"/>
+              </a:lnSpc>
+              <a:buFont typeface="Arial"/>
+              <a:buChar char="•"/>
+            </a:pPr>
+            <a:r>
+              <a:rPr lang="en-US" sz="2800" dirty="0" smtClean="0"/>
+              <a:t>By the principle of Occam’s Razor, we chose AdaBoost + Decision Stump as the classifier of </a:t>
+            </a:r>
+            <a:r>
+              <a:rPr lang="en-US" sz="2800" b="1" dirty="0" smtClean="0"/>
+              <a:t>EavesDroid</a:t>
+            </a:r>
           </a:p>
         </p:txBody>
       </p:sp>
@@ -14379,12 +14469,21 @@
             <p:ph type="body" sz="quarter" idx="29"/>
           </p:nvPr>
         </p:nvSpPr>
-        <p:spPr/>
+        <p:spPr>
+          <a:xfrm>
+            <a:off x="29395742" y="30780376"/>
+            <a:ext cx="13576029" cy="754045"/>
+          </a:xfrm>
+        </p:spPr>
         <p:txBody>
           <a:bodyPr/>
           <a:lstStyle/>
           <a:p>
-            <a:endParaRPr lang="en-US"/>
+            <a:r>
+              <a:rPr lang="en-US" dirty="0" smtClean="0"/>
+              <a:t>Challenges and Future Work</a:t>
+            </a:r>
+            <a:endParaRPr lang="en-US" dirty="0"/>
           </a:p>
         </p:txBody>
       </p:sp>
@@ -14398,12 +14497,137 @@
             <p:ph type="body" sz="quarter" idx="30"/>
           </p:nvPr>
         </p:nvSpPr>
-        <p:spPr/>
+        <p:spPr>
+          <a:xfrm>
+            <a:off x="29390710" y="31796788"/>
+            <a:ext cx="13581061" cy="7858540"/>
+          </a:xfrm>
+        </p:spPr>
         <p:txBody>
           <a:bodyPr/>
           <a:lstStyle/>
           <a:p>
-            <a:endParaRPr lang="en-US"/>
+            <a:pPr marL="457200" indent="-457200">
+              <a:lnSpc>
+                <a:spcPct val="120000"/>
+              </a:lnSpc>
+              <a:buFont typeface="Arial"/>
+              <a:buChar char="•"/>
+            </a:pPr>
+            <a:r>
+              <a:rPr lang="en-US" sz="2800" dirty="0" smtClean="0"/>
+              <a:t>Number of candidate words increases along with dictionary size</a:t>
+            </a:r>
+          </a:p>
+          <a:p>
+            <a:pPr marL="1943025" lvl="1" indent="-457200">
+              <a:lnSpc>
+                <a:spcPct val="120000"/>
+              </a:lnSpc>
+              <a:buFont typeface="Arial"/>
+              <a:buChar char="•"/>
+            </a:pPr>
+            <a:r>
+              <a:rPr lang="en-US" sz="2800" dirty="0"/>
+              <a:t>L</a:t>
+            </a:r>
+            <a:r>
+              <a:rPr lang="en-US" sz="2800" dirty="0" smtClean="0"/>
+              <a:t>eads to additional work in contextual identification</a:t>
+            </a:r>
+          </a:p>
+          <a:p>
+            <a:pPr marL="1943025" lvl="1" indent="-457200">
+              <a:lnSpc>
+                <a:spcPct val="120000"/>
+              </a:lnSpc>
+              <a:buFont typeface="Arial"/>
+              <a:buChar char="•"/>
+            </a:pPr>
+            <a:r>
+              <a:rPr lang="en-US" sz="2800" dirty="0" smtClean="0"/>
+              <a:t>Reducing search space is a possible solution (grouping letters into triads)</a:t>
+            </a:r>
+            <a:endParaRPr lang="en-US" sz="2800" dirty="0"/>
+          </a:p>
+          <a:p>
+            <a:pPr marL="457200" indent="-457200">
+              <a:lnSpc>
+                <a:spcPct val="120000"/>
+              </a:lnSpc>
+              <a:buFont typeface="Arial"/>
+              <a:buChar char="•"/>
+            </a:pPr>
+            <a:r>
+              <a:rPr lang="en-US" sz="2800" dirty="0" smtClean="0"/>
+              <a:t>Accelerometer is extremely sensitive to surrounding noises</a:t>
+            </a:r>
+          </a:p>
+          <a:p>
+            <a:pPr marL="1943025" lvl="1" indent="-457200">
+              <a:lnSpc>
+                <a:spcPct val="120000"/>
+              </a:lnSpc>
+              <a:buFont typeface="Arial"/>
+              <a:buChar char="•"/>
+            </a:pPr>
+            <a:r>
+              <a:rPr lang="en-US" sz="2800" dirty="0" smtClean="0"/>
+              <a:t>Better signal filtering techniques required</a:t>
+            </a:r>
+          </a:p>
+          <a:p>
+            <a:pPr marL="1943025" lvl="1" indent="-457200">
+              <a:lnSpc>
+                <a:spcPct val="120000"/>
+              </a:lnSpc>
+              <a:buFont typeface="Arial"/>
+              <a:buChar char="•"/>
+            </a:pPr>
+            <a:r>
+              <a:rPr lang="en-US" sz="2800" dirty="0" smtClean="0"/>
+              <a:t>With advanced signal filtering techniques profiling of consecutive key presses into the model</a:t>
+            </a:r>
+          </a:p>
+          <a:p>
+            <a:pPr marL="457200" indent="-457200">
+              <a:lnSpc>
+                <a:spcPct val="120000"/>
+              </a:lnSpc>
+              <a:buFont typeface="Arial"/>
+              <a:buChar char="•"/>
+            </a:pPr>
+            <a:r>
+              <a:rPr lang="en-US" sz="2800" dirty="0"/>
+              <a:t>Clustering on the letters’ signals and labeling them based on the frequency of each letter’s average appearance</a:t>
+            </a:r>
+          </a:p>
+          <a:p>
+            <a:pPr marL="457200" indent="-457200">
+              <a:lnSpc>
+                <a:spcPct val="120000"/>
+              </a:lnSpc>
+              <a:buFont typeface="Arial"/>
+              <a:buChar char="•"/>
+            </a:pPr>
+            <a:r>
+              <a:rPr lang="en-US" sz="2800" dirty="0" smtClean="0"/>
+              <a:t>Building the model on a word’s signal instead of the letter’s signal might identify</a:t>
+            </a:r>
+            <a:r>
+              <a:rPr lang="en-US" sz="2800" dirty="0" smtClean="0"/>
+              <a:t> word signatures with greater accuracy</a:t>
+            </a:r>
+          </a:p>
+          <a:p>
+            <a:pPr marL="457200" indent="-457200">
+              <a:lnSpc>
+                <a:spcPct val="120000"/>
+              </a:lnSpc>
+              <a:buFont typeface="Arial"/>
+              <a:buChar char="•"/>
+            </a:pPr>
+            <a:endParaRPr lang="en-US" sz="2800" dirty="0" smtClean="0"/>
           </a:p>
         </p:txBody>
       </p:sp>
@@ -14526,8 +14750,8 @@
         </p:nvGrpSpPr>
         <p:grpSpPr>
           <a:xfrm>
-            <a:off x="16244455" y="11248975"/>
-            <a:ext cx="11226029" cy="9277967"/>
+            <a:off x="15913147" y="11248975"/>
+            <a:ext cx="12102768" cy="9939009"/>
             <a:chOff x="16635946" y="10374061"/>
             <a:chExt cx="10302766" cy="7759385"/>
           </a:xfrm>
@@ -16328,8 +16552,8 @@
         </p:nvGrpSpPr>
         <p:grpSpPr>
           <a:xfrm>
-            <a:off x="15990141" y="26165440"/>
-            <a:ext cx="11639652" cy="5152511"/>
+            <a:off x="15603615" y="27214582"/>
+            <a:ext cx="12743608" cy="6064658"/>
             <a:chOff x="17171601" y="33011758"/>
             <a:chExt cx="9029436" cy="3078322"/>
           </a:xfrm>
@@ -17407,7 +17631,7 @@
         </p:nvSpPr>
         <p:spPr>
           <a:xfrm>
-            <a:off x="15606884" y="11694187"/>
+            <a:off x="15606884" y="11907246"/>
             <a:ext cx="2256948" cy="338554"/>
           </a:xfrm>
           <a:prstGeom prst="rect">
@@ -17437,7 +17661,7 @@
         </p:nvSpPr>
         <p:spPr>
           <a:xfrm>
-            <a:off x="15606884" y="16836235"/>
+            <a:off x="15606884" y="17433875"/>
             <a:ext cx="2256948" cy="338554"/>
           </a:xfrm>
           <a:prstGeom prst="rect">
@@ -17467,7 +17691,7 @@
         </p:nvSpPr>
         <p:spPr>
           <a:xfrm>
-            <a:off x="25878664" y="18548004"/>
+            <a:off x="26321607" y="19068089"/>
             <a:ext cx="1005003" cy="830997"/>
           </a:xfrm>
           <a:prstGeom prst="rect">
@@ -17500,14 +17724,14 @@
           <p:nvPr>
             <p:extLst>
               <p:ext uri="{D42A27DB-BD31-4B8C-83A1-F6EECF244321}">
-                <p14:modId xmlns:p14="http://schemas.microsoft.com/office/powerpoint/2010/main" val="467041098"/>
+                <p14:modId xmlns:p14="http://schemas.microsoft.com/office/powerpoint/2010/main" val="1878580852"/>
               </p:ext>
             </p:extLst>
           </p:nvPr>
         </p:nvGraphicFramePr>
         <p:xfrm>
-          <a:off x="32408374" y="12994116"/>
-          <a:ext cx="7886351" cy="6362376"/>
+          <a:off x="32149875" y="11380953"/>
+          <a:ext cx="7886351" cy="6650802"/>
         </p:xfrm>
         <a:graphic>
           <a:graphicData uri="http://schemas.openxmlformats.org/drawingml/2006/table">
@@ -17528,18 +17752,18 @@
                     <a:p>
                       <a:pPr algn="ctr"/>
                       <a:r>
-                        <a:rPr lang="en-US" sz="2000" dirty="0" smtClean="0"/>
+                        <a:rPr lang="en-US" sz="2600" dirty="0" smtClean="0"/>
                         <a:t>Labeled</a:t>
                       </a:r>
                       <a:r>
-                        <a:rPr lang="en-US" sz="2000" baseline="0" dirty="0" smtClean="0"/>
+                        <a:rPr lang="en-US" sz="2600" baseline="0" dirty="0" smtClean="0"/>
                         <a:t> </a:t>
                       </a:r>
                       <a:r>
-                        <a:rPr lang="en-US" sz="2000" dirty="0" smtClean="0"/>
+                        <a:rPr lang="en-US" sz="2600" dirty="0" smtClean="0"/>
                         <a:t>Dataset</a:t>
                       </a:r>
-                      <a:endParaRPr lang="en-US" sz="2000" dirty="0">
+                      <a:endParaRPr lang="en-US" sz="2600" dirty="0">
                         <a:solidFill>
                           <a:schemeClr val="tx1"/>
                         </a:solidFill>
@@ -17555,10 +17779,10 @@
                     <a:p>
                       <a:pPr algn="ctr"/>
                       <a:r>
-                        <a:rPr lang="en-US" sz="2000" dirty="0" smtClean="0"/>
+                        <a:rPr lang="en-US" sz="2600" dirty="0" smtClean="0"/>
                         <a:t>Algorithm</a:t>
                       </a:r>
-                      <a:endParaRPr lang="en-US" sz="2000" dirty="0">
+                      <a:endParaRPr lang="en-US" sz="2600" dirty="0">
                         <a:solidFill>
                           <a:schemeClr val="tx1"/>
                         </a:solidFill>
@@ -17574,10 +17798,10 @@
                     <a:p>
                       <a:pPr algn="ctr"/>
                       <a:r>
-                        <a:rPr lang="en-US" sz="2000" dirty="0" smtClean="0"/>
+                        <a:rPr lang="en-US" sz="2600" dirty="0" smtClean="0"/>
                         <a:t>Test Accuracy (%)</a:t>
                       </a:r>
-                      <a:endParaRPr lang="en-US" sz="2000" dirty="0">
+                      <a:endParaRPr lang="en-US" sz="2600" dirty="0">
                         <a:solidFill>
                           <a:schemeClr val="tx1"/>
                         </a:solidFill>
@@ -17595,10 +17819,10 @@
                     <a:p>
                       <a:pPr algn="ctr"/>
                       <a:r>
-                        <a:rPr lang="en-US" sz="2000" dirty="0" smtClean="0"/>
+                        <a:rPr lang="en-US" sz="2600" dirty="0" smtClean="0"/>
                         <a:t>L/R</a:t>
                       </a:r>
-                      <a:endParaRPr lang="en-US" sz="2000" dirty="0"/>
+                      <a:endParaRPr lang="en-US" sz="2600" dirty="0"/>
                     </a:p>
                   </a:txBody>
                   <a:tcPr/>
@@ -17610,10 +17834,10 @@
                     <a:p>
                       <a:pPr algn="ctr"/>
                       <a:r>
-                        <a:rPr lang="en-US" sz="2000" dirty="0" smtClean="0"/>
+                        <a:rPr lang="en-US" sz="2600" dirty="0" smtClean="0"/>
                         <a:t>AdaBoost (RandomForests)</a:t>
                       </a:r>
-                      <a:endParaRPr lang="en-US" sz="2000" dirty="0"/>
+                      <a:endParaRPr lang="en-US" sz="2600" dirty="0"/>
                     </a:p>
                   </a:txBody>
                   <a:tcPr/>
@@ -17625,10 +17849,10 @@
                     <a:p>
                       <a:pPr algn="ctr"/>
                       <a:r>
-                        <a:rPr lang="en-US" sz="2000" dirty="0" smtClean="0"/>
+                        <a:rPr lang="en-US" sz="2600" dirty="0" smtClean="0"/>
                         <a:t>68.67</a:t>
                       </a:r>
-                      <a:endParaRPr lang="en-US" sz="2000" dirty="0"/>
+                      <a:endParaRPr lang="en-US" sz="2600" dirty="0"/>
                     </a:p>
                   </a:txBody>
                   <a:tcPr/>
@@ -17668,7 +17892,7 @@
                         <a:defRPr/>
                       </a:pPr>
                       <a:r>
-                        <a:rPr lang="en-US" sz="2000" dirty="0" smtClean="0"/>
+                        <a:rPr lang="en-US" sz="2600" dirty="0" smtClean="0"/>
                         <a:t>AdaBoost (DecisionStumps)</a:t>
                       </a:r>
                     </a:p>
@@ -17682,10 +17906,10 @@
                     <a:p>
                       <a:pPr algn="ctr"/>
                       <a:r>
-                        <a:rPr lang="en-US" sz="2000" dirty="0" smtClean="0"/>
+                        <a:rPr lang="en-US" sz="2600" dirty="0" smtClean="0"/>
                         <a:t>69.82</a:t>
                       </a:r>
-                      <a:endParaRPr lang="en-US" sz="2000" dirty="0"/>
+                      <a:endParaRPr lang="en-US" sz="2600" dirty="0"/>
                     </a:p>
                   </a:txBody>
                   <a:tcPr/>
@@ -17709,14 +17933,14 @@
                     <a:p>
                       <a:pPr algn="ctr"/>
                       <a:r>
-                        <a:rPr lang="en-US" sz="2000" dirty="0" smtClean="0"/>
+                        <a:rPr lang="en-US" sz="2600" dirty="0" smtClean="0"/>
                         <a:t>Neural</a:t>
                       </a:r>
                       <a:r>
-                        <a:rPr lang="en-US" sz="2000" baseline="0" dirty="0" smtClean="0"/>
+                        <a:rPr lang="en-US" sz="2600" baseline="0" dirty="0" smtClean="0"/>
                         <a:t> Networks</a:t>
                       </a:r>
-                      <a:endParaRPr lang="en-US" sz="2000" dirty="0"/>
+                      <a:endParaRPr lang="en-US" sz="2600" dirty="0"/>
                     </a:p>
                   </a:txBody>
                   <a:tcPr/>
@@ -17728,10 +17952,10 @@
                     <a:p>
                       <a:pPr algn="ctr"/>
                       <a:r>
-                        <a:rPr lang="en-US" sz="2000" dirty="0" smtClean="0"/>
+                        <a:rPr lang="en-US" sz="2600" dirty="0" smtClean="0"/>
                         <a:t>68.10</a:t>
                       </a:r>
-                      <a:endParaRPr lang="en-US" sz="2000" dirty="0"/>
+                      <a:endParaRPr lang="en-US" sz="2600" dirty="0"/>
                     </a:p>
                   </a:txBody>
                   <a:tcPr/>
@@ -17745,10 +17969,10 @@
                     <a:p>
                       <a:pPr algn="ctr"/>
                       <a:r>
-                        <a:rPr lang="en-US" sz="2000" dirty="0" smtClean="0"/>
+                        <a:rPr lang="en-US" sz="2600" dirty="0" smtClean="0"/>
                         <a:t>U/D</a:t>
                       </a:r>
-                      <a:endParaRPr lang="en-US" sz="2000" dirty="0"/>
+                      <a:endParaRPr lang="en-US" sz="2600" dirty="0"/>
                     </a:p>
                   </a:txBody>
                   <a:tcPr/>
@@ -17776,7 +18000,7 @@
                         <a:defRPr/>
                       </a:pPr>
                       <a:r>
-                        <a:rPr lang="en-US" sz="2000" dirty="0" smtClean="0"/>
+                        <a:rPr lang="en-US" sz="2600" dirty="0" smtClean="0"/>
                         <a:t>AdaBoost (RandomForests)</a:t>
                       </a:r>
                     </a:p>
@@ -17790,10 +18014,10 @@
                     <a:p>
                       <a:pPr algn="ctr"/>
                       <a:r>
-                        <a:rPr lang="en-US" sz="2000" dirty="0" smtClean="0"/>
+                        <a:rPr lang="en-US" sz="2600" dirty="0" smtClean="0"/>
                         <a:t>56.60</a:t>
                       </a:r>
-                      <a:endParaRPr lang="en-US" sz="2000" dirty="0"/>
+                      <a:endParaRPr lang="en-US" sz="2600" dirty="0"/>
                     </a:p>
                   </a:txBody>
                   <a:tcPr/>
@@ -17817,10 +18041,10 @@
                     <a:p>
                       <a:pPr algn="ctr"/>
                       <a:r>
-                        <a:rPr lang="en-US" sz="2000" dirty="0" smtClean="0"/>
+                        <a:rPr lang="en-US" sz="2600" dirty="0" smtClean="0"/>
                         <a:t>AdaBoost (DecisionStumps)</a:t>
                       </a:r>
-                      <a:endParaRPr lang="en-US" sz="2000" dirty="0"/>
+                      <a:endParaRPr lang="en-US" sz="2600" dirty="0"/>
                     </a:p>
                   </a:txBody>
                   <a:tcPr/>
@@ -17832,10 +18056,10 @@
                     <a:p>
                       <a:pPr algn="ctr"/>
                       <a:r>
-                        <a:rPr lang="en-US" sz="2000" dirty="0" smtClean="0"/>
+                        <a:rPr lang="en-US" sz="2600" dirty="0" smtClean="0"/>
                         <a:t>58.68</a:t>
                       </a:r>
-                      <a:endParaRPr lang="en-US" sz="2000" dirty="0"/>
+                      <a:endParaRPr lang="en-US" sz="2600" dirty="0"/>
                     </a:p>
                   </a:txBody>
                   <a:tcPr/>
@@ -17859,14 +18083,14 @@
                     <a:p>
                       <a:pPr algn="ctr"/>
                       <a:r>
-                        <a:rPr lang="en-US" sz="2000" dirty="0" smtClean="0"/>
+                        <a:rPr lang="en-US" sz="2600" dirty="0" smtClean="0"/>
                         <a:t>Neural</a:t>
                       </a:r>
                       <a:r>
-                        <a:rPr lang="en-US" sz="2000" baseline="0" dirty="0" smtClean="0"/>
+                        <a:rPr lang="en-US" sz="2600" baseline="0" dirty="0" smtClean="0"/>
                         <a:t> Networks</a:t>
                       </a:r>
-                      <a:endParaRPr lang="en-US" sz="2000" dirty="0"/>
+                      <a:endParaRPr lang="en-US" sz="2600" dirty="0"/>
                     </a:p>
                   </a:txBody>
                   <a:tcPr/>
@@ -17878,10 +18102,10 @@
                     <a:p>
                       <a:pPr algn="ctr"/>
                       <a:r>
-                        <a:rPr lang="en-US" sz="2000" dirty="0" smtClean="0"/>
+                        <a:rPr lang="en-US" sz="2600" dirty="0" smtClean="0"/>
                         <a:t>58.62</a:t>
                       </a:r>
-                      <a:endParaRPr lang="en-US" sz="2000" dirty="0"/>
+                      <a:endParaRPr lang="en-US" sz="2600" dirty="0"/>
                     </a:p>
                   </a:txBody>
                   <a:tcPr/>
@@ -17895,10 +18119,10 @@
                     <a:p>
                       <a:pPr algn="ctr"/>
                       <a:r>
-                        <a:rPr lang="en-US" sz="2000" dirty="0" smtClean="0"/>
+                        <a:rPr lang="en-US" sz="2600" dirty="0" smtClean="0"/>
                         <a:t>Triads</a:t>
                       </a:r>
-                      <a:endParaRPr lang="en-US" sz="2000" dirty="0"/>
+                      <a:endParaRPr lang="en-US" sz="2600" dirty="0"/>
                     </a:p>
                   </a:txBody>
                   <a:tcPr/>
@@ -17926,7 +18150,7 @@
                         <a:defRPr/>
                       </a:pPr>
                       <a:r>
-                        <a:rPr lang="en-US" sz="2000" dirty="0" smtClean="0"/>
+                        <a:rPr lang="en-US" sz="2600" dirty="0" smtClean="0"/>
                         <a:t>AdaBoost (RandomForests)</a:t>
                       </a:r>
                     </a:p>
@@ -17940,10 +18164,10 @@
                     <a:p>
                       <a:pPr algn="ctr"/>
                       <a:r>
-                        <a:rPr lang="en-US" sz="2000" dirty="0" smtClean="0"/>
+                        <a:rPr lang="en-US" sz="2600" dirty="0" smtClean="0"/>
                         <a:t>16.37</a:t>
                       </a:r>
-                      <a:endParaRPr lang="en-US" sz="2000" dirty="0"/>
+                      <a:endParaRPr lang="en-US" sz="2600" dirty="0"/>
                     </a:p>
                   </a:txBody>
                   <a:tcPr/>
@@ -17967,10 +18191,10 @@
                     <a:p>
                       <a:pPr algn="ctr"/>
                       <a:r>
-                        <a:rPr lang="en-US" sz="2000" dirty="0" smtClean="0"/>
+                        <a:rPr lang="en-US" sz="2600" dirty="0" smtClean="0"/>
                         <a:t>AdaBoost (DecisionStumps)</a:t>
                       </a:r>
-                      <a:endParaRPr lang="en-US" sz="2000" dirty="0"/>
+                      <a:endParaRPr lang="en-US" sz="2600" dirty="0"/>
                     </a:p>
                   </a:txBody>
                   <a:tcPr/>
@@ -17982,10 +18206,10 @@
                     <a:p>
                       <a:pPr algn="ctr"/>
                       <a:r>
-                        <a:rPr lang="en-US" sz="2000" dirty="0" smtClean="0"/>
+                        <a:rPr lang="en-US" sz="2600" dirty="0" smtClean="0"/>
                         <a:t>13.21</a:t>
                       </a:r>
-                      <a:endParaRPr lang="en-US" sz="2000" dirty="0"/>
+                      <a:endParaRPr lang="en-US" sz="2600" dirty="0"/>
                     </a:p>
                   </a:txBody>
                   <a:tcPr/>
@@ -18009,14 +18233,14 @@
                     <a:p>
                       <a:pPr algn="ctr"/>
                       <a:r>
-                        <a:rPr lang="en-US" sz="2000" dirty="0" smtClean="0"/>
+                        <a:rPr lang="en-US" sz="2600" dirty="0" smtClean="0"/>
                         <a:t>Neural</a:t>
                       </a:r>
                       <a:r>
-                        <a:rPr lang="en-US" sz="2000" baseline="0" dirty="0" smtClean="0"/>
+                        <a:rPr lang="en-US" sz="2600" baseline="0" dirty="0" smtClean="0"/>
                         <a:t> Networks</a:t>
                       </a:r>
-                      <a:endParaRPr lang="en-US" sz="2000" dirty="0"/>
+                      <a:endParaRPr lang="en-US" sz="2600" dirty="0"/>
                     </a:p>
                   </a:txBody>
                   <a:tcPr/>
@@ -18028,10 +18252,10 @@
                     <a:p>
                       <a:pPr algn="ctr"/>
                       <a:r>
-                        <a:rPr lang="en-US" sz="2000" dirty="0" smtClean="0"/>
+                        <a:rPr lang="en-US" sz="2600" dirty="0" smtClean="0"/>
                         <a:t>14.65</a:t>
                       </a:r>
-                      <a:endParaRPr lang="en-US" sz="2000" dirty="0"/>
+                      <a:endParaRPr lang="en-US" sz="2600" dirty="0"/>
                     </a:p>
                   </a:txBody>
                   <a:tcPr/>
@@ -18050,26 +18274,26 @@
           <p:nvPr>
             <p:extLst>
               <p:ext uri="{D42A27DB-BD31-4B8C-83A1-F6EECF244321}">
-                <p14:modId xmlns:p14="http://schemas.microsoft.com/office/powerpoint/2010/main" val="2743974997"/>
+                <p14:modId xmlns:p14="http://schemas.microsoft.com/office/powerpoint/2010/main" val="2108207713"/>
               </p:ext>
             </p:extLst>
           </p:nvPr>
         </p:nvGraphicFramePr>
         <p:xfrm>
-          <a:off x="33085686" y="27431210"/>
-          <a:ext cx="6248400" cy="3474720"/>
+          <a:off x="32521258" y="23030468"/>
+          <a:ext cx="7073246" cy="4648657"/>
         </p:xfrm>
         <a:graphic>
           <a:graphicData uri="http://schemas.openxmlformats.org/drawingml/2006/table">
             <a:tbl>
               <a:tblPr firstRow="1" bandRow="1">
-                <a:tableStyleId>{5C22544A-7EE6-4342-B048-85BDC9FD1C3A}</a:tableStyleId>
+                <a:tableStyleId>{FABFCF23-3B69-468F-B69F-88F6DE6A72F2}</a:tableStyleId>
               </a:tblPr>
               <a:tblGrid>
-                <a:gridCol w="3124200"/>
-                <a:gridCol w="3124200"/>
+                <a:gridCol w="3536623"/>
+                <a:gridCol w="3536623"/>
               </a:tblGrid>
-              <a:tr h="370840">
+              <a:tr h="937887">
                 <a:tc>
                   <a:txBody>
                     <a:bodyPr/>
@@ -18077,14 +18301,25 @@
                     <a:p>
                       <a:pPr algn="ctr"/>
                       <a:r>
-                        <a:rPr lang="en-US" sz="2000" dirty="0" smtClean="0"/>
-                        <a:t># errors</a:t>
+                        <a:rPr lang="en-US" sz="2600" dirty="0" smtClean="0"/>
+                        <a:t># </a:t>
                       </a:r>
                       <a:r>
-                        <a:rPr lang="en-US" sz="2000" baseline="0" dirty="0" smtClean="0"/>
-                        <a:t> (L/R, U/D)</a:t>
+                        <a:rPr lang="en-US" sz="2600" dirty="0" smtClean="0"/>
+                        <a:t>labeling errors</a:t>
                       </a:r>
-                      <a:endParaRPr lang="en-US" sz="2000" dirty="0"/>
+                    </a:p>
+                    <a:p>
+                      <a:pPr algn="ctr"/>
+                      <a:r>
+                        <a:rPr lang="en-US" sz="2600" baseline="0" dirty="0" smtClean="0"/>
+                        <a:t> </a:t>
+                      </a:r>
+                      <a:r>
+                        <a:rPr lang="en-US" sz="2600" baseline="0" dirty="0" smtClean="0"/>
+                        <a:t>(L/R, U/D)</a:t>
+                      </a:r>
+                      <a:endParaRPr lang="en-US" sz="2600" dirty="0"/>
                     </a:p>
                   </a:txBody>
                   <a:tcPr/>
@@ -18096,20 +18331,20 @@
                     <a:p>
                       <a:pPr algn="ctr"/>
                       <a:r>
-                        <a:rPr lang="en-US" sz="2000" dirty="0" smtClean="0"/>
+                        <a:rPr lang="en-US" sz="2600" dirty="0" smtClean="0"/>
                         <a:t>Recovered</a:t>
                       </a:r>
                       <a:r>
-                        <a:rPr lang="en-US" sz="2000" baseline="0" dirty="0" smtClean="0"/>
+                        <a:rPr lang="en-US" sz="2600" baseline="0" dirty="0" smtClean="0"/>
                         <a:t> Words Accuracy (%)</a:t>
                       </a:r>
-                      <a:endParaRPr lang="en-US" sz="2000" dirty="0"/>
+                      <a:endParaRPr lang="en-US" sz="2600" dirty="0"/>
                     </a:p>
                   </a:txBody>
                   <a:tcPr/>
                 </a:tc>
               </a:tr>
-              <a:tr h="370840">
+              <a:tr h="530110">
                 <a:tc>
                   <a:txBody>
                     <a:bodyPr/>
@@ -18117,7 +18352,7 @@
                     <a:p>
                       <a:pPr algn="ctr"/>
                       <a:r>
-                        <a:rPr lang="en-US" sz="2000" dirty="0" smtClean="0"/>
+                        <a:rPr lang="en-US" sz="2600" dirty="0" smtClean="0"/>
                         <a:t>0</a:t>
                       </a:r>
                     </a:p>
@@ -18131,16 +18366,16 @@
                     <a:p>
                       <a:pPr algn="ctr"/>
                       <a:r>
-                        <a:rPr lang="en-US" sz="2000" dirty="0" smtClean="0"/>
+                        <a:rPr lang="en-US" sz="2600" dirty="0" smtClean="0"/>
                         <a:t>5.46</a:t>
                       </a:r>
-                      <a:endParaRPr lang="en-US" sz="2000" dirty="0"/>
+                      <a:endParaRPr lang="en-US" sz="2600" dirty="0"/>
                     </a:p>
                   </a:txBody>
                   <a:tcPr/>
                 </a:tc>
               </a:tr>
-              <a:tr h="370840">
+              <a:tr h="530110">
                 <a:tc>
                   <a:txBody>
                     <a:bodyPr/>
@@ -18148,10 +18383,10 @@
                     <a:p>
                       <a:pPr algn="ctr"/>
                       <a:r>
-                        <a:rPr lang="en-US" sz="2000" dirty="0" smtClean="0"/>
+                        <a:rPr lang="en-US" sz="2600" dirty="0" smtClean="0"/>
                         <a:t>1</a:t>
                       </a:r>
-                      <a:endParaRPr lang="en-US" sz="2000" dirty="0"/>
+                      <a:endParaRPr lang="en-US" sz="2600" dirty="0"/>
                     </a:p>
                   </a:txBody>
                   <a:tcPr/>
@@ -18163,16 +18398,16 @@
                     <a:p>
                       <a:pPr algn="ctr"/>
                       <a:r>
-                        <a:rPr lang="en-US" sz="2000" dirty="0" smtClean="0"/>
+                        <a:rPr lang="en-US" sz="2600" dirty="0" smtClean="0"/>
                         <a:t>23.41</a:t>
                       </a:r>
-                      <a:endParaRPr lang="en-US" sz="2000" dirty="0"/>
+                      <a:endParaRPr lang="en-US" sz="2600" dirty="0"/>
                     </a:p>
                   </a:txBody>
                   <a:tcPr/>
                 </a:tc>
               </a:tr>
-              <a:tr h="370840">
+              <a:tr h="530110">
                 <a:tc>
                   <a:txBody>
                     <a:bodyPr/>
@@ -18180,10 +18415,10 @@
                     <a:p>
                       <a:pPr algn="ctr"/>
                       <a:r>
-                        <a:rPr lang="en-US" sz="2000" dirty="0" smtClean="0"/>
+                        <a:rPr lang="en-US" sz="2600" dirty="0" smtClean="0"/>
                         <a:t>2</a:t>
                       </a:r>
-                      <a:endParaRPr lang="en-US" sz="2000" dirty="0"/>
+                      <a:endParaRPr lang="en-US" sz="2600" dirty="0"/>
                     </a:p>
                   </a:txBody>
                   <a:tcPr/>
@@ -18195,16 +18430,16 @@
                     <a:p>
                       <a:pPr algn="ctr"/>
                       <a:r>
-                        <a:rPr lang="en-US" sz="2000" dirty="0" smtClean="0"/>
+                        <a:rPr lang="en-US" sz="2600" dirty="0" smtClean="0"/>
                         <a:t>41.64</a:t>
                       </a:r>
-                      <a:endParaRPr lang="en-US" sz="2000" dirty="0"/>
+                      <a:endParaRPr lang="en-US" sz="2600" dirty="0"/>
                     </a:p>
                   </a:txBody>
                   <a:tcPr/>
                 </a:tc>
               </a:tr>
-              <a:tr h="370840">
+              <a:tr h="530110">
                 <a:tc>
                   <a:txBody>
                     <a:bodyPr/>
@@ -18212,10 +18447,10 @@
                     <a:p>
                       <a:pPr algn="ctr"/>
                       <a:r>
-                        <a:rPr lang="en-US" sz="2000" dirty="0" smtClean="0"/>
+                        <a:rPr lang="en-US" sz="2600" dirty="0" smtClean="0"/>
                         <a:t>3</a:t>
                       </a:r>
-                      <a:endParaRPr lang="en-US" sz="2000" dirty="0"/>
+                      <a:endParaRPr lang="en-US" sz="2600" dirty="0"/>
                     </a:p>
                   </a:txBody>
                   <a:tcPr/>
@@ -18227,16 +18462,16 @@
                     <a:p>
                       <a:pPr algn="ctr"/>
                       <a:r>
-                        <a:rPr lang="en-US" sz="2000" dirty="0" smtClean="0"/>
+                        <a:rPr lang="en-US" sz="2600" dirty="0" smtClean="0"/>
                         <a:t>70.31</a:t>
                       </a:r>
-                      <a:endParaRPr lang="en-US" sz="2000" dirty="0"/>
+                      <a:endParaRPr lang="en-US" sz="2600" dirty="0"/>
                     </a:p>
                   </a:txBody>
                   <a:tcPr/>
                 </a:tc>
               </a:tr>
-              <a:tr h="370840">
+              <a:tr h="530110">
                 <a:tc>
                   <a:txBody>
                     <a:bodyPr/>
@@ -18244,10 +18479,10 @@
                     <a:p>
                       <a:pPr algn="ctr"/>
                       <a:r>
-                        <a:rPr lang="en-US" sz="2000" dirty="0" smtClean="0"/>
+                        <a:rPr lang="en-US" sz="2600" dirty="0" smtClean="0"/>
                         <a:t>4</a:t>
                       </a:r>
-                      <a:endParaRPr lang="en-US" sz="2000" dirty="0"/>
+                      <a:endParaRPr lang="en-US" sz="2600" dirty="0"/>
                     </a:p>
                   </a:txBody>
                   <a:tcPr/>
@@ -18259,16 +18494,16 @@
                     <a:p>
                       <a:pPr algn="ctr"/>
                       <a:r>
-                        <a:rPr lang="en-US" sz="2000" dirty="0" smtClean="0"/>
+                        <a:rPr lang="en-US" sz="2600" dirty="0" smtClean="0"/>
                         <a:t>85.67</a:t>
                       </a:r>
-                      <a:endParaRPr lang="en-US" sz="2000" dirty="0"/>
+                      <a:endParaRPr lang="en-US" sz="2600" dirty="0"/>
                     </a:p>
                   </a:txBody>
                   <a:tcPr/>
                 </a:tc>
               </a:tr>
-              <a:tr h="370840">
+              <a:tr h="530110">
                 <a:tc>
                   <a:txBody>
                     <a:bodyPr/>
@@ -18276,10 +18511,10 @@
                     <a:p>
                       <a:pPr algn="ctr"/>
                       <a:r>
-                        <a:rPr lang="en-US" sz="2000" dirty="0" smtClean="0"/>
+                        <a:rPr lang="en-US" sz="2600" dirty="0" smtClean="0"/>
                         <a:t>5</a:t>
                       </a:r>
-                      <a:endParaRPr lang="en-US" sz="2000" dirty="0"/>
+                      <a:endParaRPr lang="en-US" sz="2600" dirty="0"/>
                     </a:p>
                   </a:txBody>
                   <a:tcPr/>
@@ -18291,16 +18526,16 @@
                     <a:p>
                       <a:pPr algn="ctr"/>
                       <a:r>
-                        <a:rPr lang="en-US" sz="2000" dirty="0" smtClean="0"/>
+                        <a:rPr lang="en-US" sz="2600" dirty="0" smtClean="0"/>
                         <a:t>94.54</a:t>
                       </a:r>
-                      <a:endParaRPr lang="en-US" sz="2000" dirty="0"/>
+                      <a:endParaRPr lang="en-US" sz="2600" dirty="0"/>
                     </a:p>
                   </a:txBody>
                   <a:tcPr/>
                 </a:tc>
               </a:tr>
-              <a:tr h="370840">
+              <a:tr h="530110">
                 <a:tc>
                   <a:txBody>
                     <a:bodyPr/>
@@ -18308,10 +18543,10 @@
                     <a:p>
                       <a:pPr algn="ctr"/>
                       <a:r>
-                        <a:rPr lang="en-US" sz="2000" dirty="0" smtClean="0"/>
+                        <a:rPr lang="en-US" sz="2600" dirty="0" smtClean="0"/>
                         <a:t>6</a:t>
                       </a:r>
-                      <a:endParaRPr lang="en-US" sz="2000" dirty="0"/>
+                      <a:endParaRPr lang="en-US" sz="2600" dirty="0"/>
                     </a:p>
                   </a:txBody>
                   <a:tcPr/>
@@ -18323,10 +18558,10 @@
                     <a:p>
                       <a:pPr algn="ctr"/>
                       <a:r>
-                        <a:rPr lang="en-US" sz="2000" dirty="0" smtClean="0"/>
+                        <a:rPr lang="en-US" sz="2600" dirty="0" smtClean="0"/>
                         <a:t>97.27</a:t>
                       </a:r>
-                      <a:endParaRPr lang="en-US" sz="2000" dirty="0"/>
+                      <a:endParaRPr lang="en-US" sz="2600" dirty="0"/>
                     </a:p>
                   </a:txBody>
                   <a:tcPr/>
@@ -18358,8 +18593,8 @@
         </p:blipFill>
         <p:spPr>
           <a:xfrm>
-            <a:off x="16547075" y="34852924"/>
-            <a:ext cx="10626224" cy="3268344"/>
+            <a:off x="16178443" y="37310034"/>
+            <a:ext cx="11713802" cy="3602854"/>
           </a:xfrm>
           <a:prstGeom prst="rect">
             <a:avLst/>
@@ -19444,8 +19679,8 @@
         </p:nvSpPr>
         <p:spPr>
           <a:xfrm>
-            <a:off x="15238762" y="21187984"/>
-            <a:ext cx="13571534" cy="5029047"/>
+            <a:off x="15238762" y="21574510"/>
+            <a:ext cx="13571534" cy="5632289"/>
           </a:xfrm>
           <a:prstGeom prst="rect">
             <a:avLst/>
@@ -19656,6 +19891,19 @@
             </a:pPr>
             <a:r>
               <a:rPr lang="en-US" sz="2800" dirty="0" smtClean="0"/>
+              <a:t>Each n-letter word gets 2n-labels</a:t>
+            </a:r>
+          </a:p>
+          <a:p>
+            <a:pPr marL="1828725" lvl="1" indent="-342900">
+              <a:lnSpc>
+                <a:spcPct val="120000"/>
+              </a:lnSpc>
+              <a:buFont typeface="Arial"/>
+              <a:buChar char="•"/>
+            </a:pPr>
+            <a:r>
+              <a:rPr lang="en-US" sz="2800" dirty="0" smtClean="0"/>
               <a:t>Hamming distance with each dictionary word is computed</a:t>
             </a:r>
           </a:p>
@@ -19688,6 +19936,252 @@
               <a:rPr lang="en-US" sz="2800" dirty="0" smtClean="0"/>
               <a:t>Example</a:t>
             </a:r>
+          </a:p>
+        </p:txBody>
+      </p:sp>
+      <p:sp>
+        <p:nvSpPr>
+          <p:cNvPr id="173" name="Text Placeholder 361"/>
+          <p:cNvSpPr>
+            <a:spLocks noGrp="1"/>
+          </p:cNvSpPr>
+          <p:nvPr>
+            <p:ph type="body" sz="quarter" idx="26"/>
+          </p:nvPr>
+        </p:nvSpPr>
+        <p:spPr>
+          <a:xfrm>
+            <a:off x="29400775" y="18457969"/>
+            <a:ext cx="13576029" cy="4195999"/>
+          </a:xfrm>
+        </p:spPr>
+        <p:txBody>
+          <a:bodyPr/>
+          <a:lstStyle/>
+          <a:p>
+            <a:pPr marL="457200" indent="-457200">
+              <a:lnSpc>
+                <a:spcPct val="120000"/>
+              </a:lnSpc>
+              <a:buFont typeface="Arial"/>
+              <a:buChar char="•"/>
+            </a:pPr>
+            <a:r>
+              <a:rPr lang="en-US" sz="2800" dirty="0" smtClean="0"/>
+              <a:t>Data set = Training set (66%) TR + Test set (33%) TE </a:t>
+            </a:r>
+          </a:p>
+          <a:p>
+            <a:pPr marL="1943025" lvl="1" indent="-457200">
+              <a:lnSpc>
+                <a:spcPct val="120000"/>
+              </a:lnSpc>
+              <a:buFont typeface="Arial"/>
+              <a:buChar char="•"/>
+            </a:pPr>
+            <a:r>
+              <a:rPr lang="en-US" sz="2800" dirty="0" smtClean="0"/>
+              <a:t>Prediction model built using TR</a:t>
+            </a:r>
+          </a:p>
+          <a:p>
+            <a:pPr marL="1943025" lvl="1" indent="-457200">
+              <a:lnSpc>
+                <a:spcPct val="120000"/>
+              </a:lnSpc>
+              <a:buFont typeface="Arial"/>
+              <a:buChar char="•"/>
+            </a:pPr>
+            <a:endParaRPr lang="en-US" sz="1000" dirty="0" smtClean="0"/>
+          </a:p>
+          <a:p>
+            <a:pPr marL="457200" indent="-457200">
+              <a:lnSpc>
+                <a:spcPct val="120000"/>
+              </a:lnSpc>
+              <a:buFont typeface="Arial"/>
+              <a:buChar char="•"/>
+            </a:pPr>
+            <a:r>
+              <a:rPr lang="en-US" sz="2800" dirty="0" smtClean="0"/>
+              <a:t>Experiment 1: 72 sets of Harvard sentences (4490 words)</a:t>
+            </a:r>
+          </a:p>
+          <a:p>
+            <a:pPr marL="1943025" lvl="1" indent="-457200">
+              <a:lnSpc>
+                <a:spcPct val="120000"/>
+              </a:lnSpc>
+              <a:buFont typeface="Arial"/>
+              <a:buChar char="•"/>
+            </a:pPr>
+            <a:r>
+              <a:rPr lang="en-US" sz="2800" dirty="0" smtClean="0"/>
+              <a:t>Represents words using individual letter signals from TE</a:t>
+            </a:r>
+          </a:p>
+          <a:p>
+            <a:pPr marL="1943025" lvl="1" indent="-457200">
+              <a:lnSpc>
+                <a:spcPct val="120000"/>
+              </a:lnSpc>
+              <a:buFont typeface="Arial"/>
+              <a:buChar char="•"/>
+            </a:pPr>
+            <a:r>
+              <a:rPr lang="en-US" sz="2800" dirty="0" smtClean="0"/>
+              <a:t>Among 4490 words</a:t>
+            </a:r>
+          </a:p>
+          <a:p>
+            <a:pPr marL="2514497" lvl="2" indent="-457200">
+              <a:lnSpc>
+                <a:spcPct val="120000"/>
+              </a:lnSpc>
+              <a:buFont typeface="Arial"/>
+              <a:buChar char="•"/>
+            </a:pPr>
+            <a:r>
+              <a:rPr lang="en-US" sz="2800" dirty="0" smtClean="0"/>
+              <a:t>85.67% have less than 5 labeling errors</a:t>
+            </a:r>
+            <a:endParaRPr lang="en-US" sz="2800" dirty="0"/>
+          </a:p>
+        </p:txBody>
+      </p:sp>
+      <p:sp>
+        <p:nvSpPr>
+          <p:cNvPr id="174" name="Text Placeholder 361"/>
+          <p:cNvSpPr>
+            <a:spLocks noGrp="1"/>
+          </p:cNvSpPr>
+          <p:nvPr>
+            <p:ph type="body" sz="quarter" idx="26"/>
+          </p:nvPr>
+        </p:nvSpPr>
+        <p:spPr>
+          <a:xfrm>
+            <a:off x="29400775" y="28394856"/>
+            <a:ext cx="13576029" cy="2170828"/>
+          </a:xfrm>
+        </p:spPr>
+        <p:txBody>
+          <a:bodyPr/>
+          <a:lstStyle/>
+          <a:p>
+            <a:pPr marL="457200" indent="-457200">
+              <a:lnSpc>
+                <a:spcPct val="120000"/>
+              </a:lnSpc>
+              <a:buFont typeface="Arial"/>
+              <a:buChar char="•"/>
+            </a:pPr>
+            <a:r>
+              <a:rPr lang="en-US" sz="2800" dirty="0" smtClean="0"/>
+              <a:t>Experiment 2: New York Times article (138 dictionary words + 257 new words)</a:t>
+            </a:r>
+          </a:p>
+          <a:p>
+            <a:pPr marL="1943025" lvl="1" indent="-457200">
+              <a:lnSpc>
+                <a:spcPct val="120000"/>
+              </a:lnSpc>
+              <a:buFont typeface="Arial"/>
+              <a:buChar char="•"/>
+            </a:pPr>
+            <a:r>
+              <a:rPr lang="en-US" sz="2800" dirty="0" smtClean="0"/>
+              <a:t>121 out of 138 dictionary words have less than 5 labeling errors</a:t>
+            </a:r>
+          </a:p>
+          <a:p>
+            <a:pPr marL="1943025" lvl="1" indent="-457200">
+              <a:lnSpc>
+                <a:spcPct val="120000"/>
+              </a:lnSpc>
+              <a:buFont typeface="Arial"/>
+              <a:buChar char="•"/>
+            </a:pPr>
+            <a:r>
+              <a:rPr lang="en-US" sz="2800" dirty="0" smtClean="0"/>
+              <a:t>This demonstrates practical applications of EavesDroid</a:t>
+            </a:r>
+            <a:endParaRPr lang="en-US" sz="2800" dirty="0"/>
+          </a:p>
+        </p:txBody>
+      </p:sp>
+      <p:sp>
+        <p:nvSpPr>
+          <p:cNvPr id="175" name="Text Placeholder 364"/>
+          <p:cNvSpPr>
+            <a:spLocks noGrp="1"/>
+          </p:cNvSpPr>
+          <p:nvPr>
+            <p:ph type="body" sz="quarter" idx="29"/>
+          </p:nvPr>
+        </p:nvSpPr>
+        <p:spPr>
+          <a:xfrm>
+            <a:off x="29405807" y="39164623"/>
+            <a:ext cx="13576029" cy="754045"/>
+          </a:xfrm>
+        </p:spPr>
+        <p:txBody>
+          <a:bodyPr/>
+          <a:lstStyle/>
+          <a:p>
+            <a:r>
+              <a:rPr lang="en-US" dirty="0" smtClean="0"/>
+              <a:t>Conclusion</a:t>
+            </a:r>
+            <a:endParaRPr lang="en-US" dirty="0"/>
+          </a:p>
+        </p:txBody>
+      </p:sp>
+      <p:sp>
+        <p:nvSpPr>
+          <p:cNvPr id="176" name="Text Placeholder 365"/>
+          <p:cNvSpPr>
+            <a:spLocks noGrp="1"/>
+          </p:cNvSpPr>
+          <p:nvPr>
+            <p:ph type="body" sz="quarter" idx="30"/>
+          </p:nvPr>
+        </p:nvSpPr>
+        <p:spPr>
+          <a:xfrm>
+            <a:off x="29390710" y="39847477"/>
+            <a:ext cx="13581061" cy="1998473"/>
+          </a:xfrm>
+        </p:spPr>
+        <p:txBody>
+          <a:bodyPr/>
+          <a:lstStyle/>
+          <a:p>
+            <a:pPr marL="457200" indent="-457200">
+              <a:lnSpc>
+                <a:spcPct val="120000"/>
+              </a:lnSpc>
+              <a:buFont typeface="Arial"/>
+              <a:buChar char="•"/>
+            </a:pPr>
+            <a:r>
+              <a:rPr lang="en-US" sz="2800" dirty="0" smtClean="0"/>
+              <a:t>Provide a simple model based on AdaBoost + </a:t>
+            </a:r>
+            <a:r>
+              <a:rPr lang="en-US" sz="2800" dirty="0"/>
+              <a:t>Decision </a:t>
+            </a:r>
+            <a:r>
+              <a:rPr lang="en-US" sz="2800" dirty="0" smtClean="0"/>
+              <a:t>Stump and achieve comparable accuracies to a Neural Network based model used by Marquardt </a:t>
+            </a:r>
+            <a:r>
+              <a:rPr lang="en-US" sz="2800" i="1" dirty="0" smtClean="0"/>
+              <a:t>et. al</a:t>
+            </a:r>
+            <a:endParaRPr lang="en-US" sz="2800" dirty="0" smtClean="0"/>
           </a:p>
         </p:txBody>
       </p:sp>

</xml_diff>

<commit_message>
changed title font size
</commit_message>
<xml_diff>
--- a/poster/poster.pptx
+++ b/poster/poster.pptx
@@ -5105,7 +5105,7 @@
               <a:graphicData uri="http://schemas.openxmlformats.org/presentationml/2006/ole">
                 <mc:AlternateContent xmlns:mc="http://schemas.openxmlformats.org/markup-compatibility/2006">
                   <mc:Choice xmlns:v="urn:schemas-microsoft-com:vml" Requires="v">
-                    <p:oleObj spid="_x0000_s1151" name="Image" r:id="rId8" imgW="1828440" imgH="1117440" progId="Photoshop.Image.13">
+                    <p:oleObj spid="_x0000_s1167" name="Image" r:id="rId8" imgW="1828440" imgH="1117440" progId="Photoshop.Image.13">
                       <p:embed/>
                     </p:oleObj>
                   </mc:Choice>
@@ -5162,7 +5162,7 @@
               <a:graphicData uri="http://schemas.openxmlformats.org/presentationml/2006/ole">
                 <mc:AlternateContent xmlns:mc="http://schemas.openxmlformats.org/markup-compatibility/2006">
                   <mc:Choice xmlns:v="urn:schemas-microsoft-com:vml" Requires="v">
-                    <p:oleObj spid="_x0000_s1152" name="Image" r:id="rId10" imgW="1828440" imgH="1117440" progId="Photoshop.Image.13">
+                    <p:oleObj spid="_x0000_s1168" name="Image" r:id="rId10" imgW="1828440" imgH="1117440" progId="Photoshop.Image.13">
                       <p:embed/>
                     </p:oleObj>
                   </mc:Choice>
@@ -6312,7 +6312,7 @@
             <a:graphicData uri="http://schemas.openxmlformats.org/presentationml/2006/ole">
               <mc:AlternateContent xmlns:mc="http://schemas.openxmlformats.org/markup-compatibility/2006">
                 <mc:Choice xmlns:v="urn:schemas-microsoft-com:vml" Requires="v">
-                  <p:oleObj spid="_x0000_s1153" name="Image" r:id="rId12" imgW="4571280" imgH="1688760" progId="Photoshop.Image.13">
+                  <p:oleObj spid="_x0000_s1169" name="Image" r:id="rId12" imgW="4571280" imgH="1688760" progId="Photoshop.Image.13">
                     <p:embed/>
                   </p:oleObj>
                 </mc:Choice>
@@ -6396,7 +6396,7 @@
             <a:graphicData uri="http://schemas.openxmlformats.org/presentationml/2006/ole">
               <mc:AlternateContent xmlns:mc="http://schemas.openxmlformats.org/markup-compatibility/2006">
                 <mc:Choice xmlns:v="urn:schemas-microsoft-com:vml" Requires="v">
-                  <p:oleObj spid="_x0000_s1154" name="Image" r:id="rId15" imgW="1574280" imgH="1053720" progId="Photoshop.Image.13">
+                  <p:oleObj spid="_x0000_s1170" name="Image" r:id="rId15" imgW="1574280" imgH="1053720" progId="Photoshop.Image.13">
                     <p:embed/>
                   </p:oleObj>
                 </mc:Choice>
@@ -8610,7 +8610,7 @@
               <a:graphicData uri="http://schemas.openxmlformats.org/presentationml/2006/ole">
                 <mc:AlternateContent xmlns:mc="http://schemas.openxmlformats.org/markup-compatibility/2006">
                   <mc:Choice xmlns:v="urn:schemas-microsoft-com:vml" Requires="v">
-                    <p:oleObj spid="_x0000_s2179" name="Image" r:id="rId8" imgW="1828440" imgH="1117440" progId="Photoshop.Image.13">
+                    <p:oleObj spid="_x0000_s2195" name="Image" r:id="rId8" imgW="1828440" imgH="1117440" progId="Photoshop.Image.13">
                       <p:embed/>
                     </p:oleObj>
                   </mc:Choice>
@@ -8667,7 +8667,7 @@
               <a:graphicData uri="http://schemas.openxmlformats.org/presentationml/2006/ole">
                 <mc:AlternateContent xmlns:mc="http://schemas.openxmlformats.org/markup-compatibility/2006">
                   <mc:Choice xmlns:v="urn:schemas-microsoft-com:vml" Requires="v">
-                    <p:oleObj spid="_x0000_s2180" name="Image" r:id="rId10" imgW="1828440" imgH="1117440" progId="Photoshop.Image.13">
+                    <p:oleObj spid="_x0000_s2196" name="Image" r:id="rId10" imgW="1828440" imgH="1117440" progId="Photoshop.Image.13">
                       <p:embed/>
                     </p:oleObj>
                   </mc:Choice>
@@ -9817,7 +9817,7 @@
             <a:graphicData uri="http://schemas.openxmlformats.org/presentationml/2006/ole">
               <mc:AlternateContent xmlns:mc="http://schemas.openxmlformats.org/markup-compatibility/2006">
                 <mc:Choice xmlns:v="urn:schemas-microsoft-com:vml" Requires="v">
-                  <p:oleObj spid="_x0000_s2181" name="Image" r:id="rId12" imgW="4571280" imgH="1688760" progId="Photoshop.Image.13">
+                  <p:oleObj spid="_x0000_s2197" name="Image" r:id="rId12" imgW="4571280" imgH="1688760" progId="Photoshop.Image.13">
                     <p:embed/>
                   </p:oleObj>
                 </mc:Choice>
@@ -9901,7 +9901,7 @@
             <a:graphicData uri="http://schemas.openxmlformats.org/presentationml/2006/ole">
               <mc:AlternateContent xmlns:mc="http://schemas.openxmlformats.org/markup-compatibility/2006">
                 <mc:Choice xmlns:v="urn:schemas-microsoft-com:vml" Requires="v">
-                  <p:oleObj spid="_x0000_s2182" name="Image" r:id="rId15" imgW="1574280" imgH="1053720" progId="Photoshop.Image.13">
+                  <p:oleObj spid="_x0000_s2198" name="Image" r:id="rId15" imgW="1574280" imgH="1053720" progId="Photoshop.Image.13">
                     <p:embed/>
                   </p:oleObj>
                 </mc:Choice>
@@ -12000,7 +12000,7 @@
               <a:graphicData uri="http://schemas.openxmlformats.org/presentationml/2006/ole">
                 <mc:AlternateContent xmlns:mc="http://schemas.openxmlformats.org/markup-compatibility/2006">
                   <mc:Choice xmlns:v="urn:schemas-microsoft-com:vml" Requires="v">
-                    <p:oleObj spid="_x0000_s3199" name="Image" r:id="rId8" imgW="1828440" imgH="1117440" progId="Photoshop.Image.13">
+                    <p:oleObj spid="_x0000_s3215" name="Image" r:id="rId8" imgW="1828440" imgH="1117440" progId="Photoshop.Image.13">
                       <p:embed/>
                     </p:oleObj>
                   </mc:Choice>
@@ -12057,7 +12057,7 @@
               <a:graphicData uri="http://schemas.openxmlformats.org/presentationml/2006/ole">
                 <mc:AlternateContent xmlns:mc="http://schemas.openxmlformats.org/markup-compatibility/2006">
                   <mc:Choice xmlns:v="urn:schemas-microsoft-com:vml" Requires="v">
-                    <p:oleObj spid="_x0000_s3200" name="Image" r:id="rId10" imgW="1828440" imgH="1117440" progId="Photoshop.Image.13">
+                    <p:oleObj spid="_x0000_s3216" name="Image" r:id="rId10" imgW="1828440" imgH="1117440" progId="Photoshop.Image.13">
                       <p:embed/>
                     </p:oleObj>
                   </mc:Choice>
@@ -13207,7 +13207,7 @@
             <a:graphicData uri="http://schemas.openxmlformats.org/presentationml/2006/ole">
               <mc:AlternateContent xmlns:mc="http://schemas.openxmlformats.org/markup-compatibility/2006">
                 <mc:Choice xmlns:v="urn:schemas-microsoft-com:vml" Requires="v">
-                  <p:oleObj spid="_x0000_s3201" name="Image" r:id="rId12" imgW="4571280" imgH="1688760" progId="Photoshop.Image.13">
+                  <p:oleObj spid="_x0000_s3217" name="Image" r:id="rId12" imgW="4571280" imgH="1688760" progId="Photoshop.Image.13">
                     <p:embed/>
                   </p:oleObj>
                 </mc:Choice>
@@ -13291,7 +13291,7 @@
             <a:graphicData uri="http://schemas.openxmlformats.org/presentationml/2006/ole">
               <mc:AlternateContent xmlns:mc="http://schemas.openxmlformats.org/markup-compatibility/2006">
                 <mc:Choice xmlns:v="urn:schemas-microsoft-com:vml" Requires="v">
-                  <p:oleObj spid="_x0000_s3202" name="Image" r:id="rId15" imgW="1574280" imgH="1053720" progId="Photoshop.Image.13">
+                  <p:oleObj spid="_x0000_s3218" name="Image" r:id="rId15" imgW="1574280" imgH="1053720" progId="Photoshop.Image.13">
                     <p:embed/>
                   </p:oleObj>
                 </mc:Choice>
@@ -14666,18 +14666,20 @@
         </p:nvSpPr>
         <p:spPr/>
         <p:txBody>
-          <a:bodyPr/>
+          <a:bodyPr>
+            <a:normAutofit/>
+          </a:bodyPr>
           <a:lstStyle/>
           <a:p>
             <a:r>
-              <a:rPr lang="en-US" dirty="0" smtClean="0"/>
+              <a:rPr lang="en-US" sz="8500" dirty="0" smtClean="0"/>
               <a:t>Jennifer Guo      Yi-Hsien Lin      Akshay Mittal      </a:t>
             </a:r>
             <a:r>
-              <a:rPr lang="en-US" dirty="0"/>
+              <a:rPr lang="en-US" sz="8500" dirty="0"/>
               <a:t>Wathsala Vithanage</a:t>
             </a:r>
-            <a:endParaRPr lang="en-US" dirty="0"/>
+            <a:endParaRPr lang="en-US" sz="8500" dirty="0"/>
           </a:p>
         </p:txBody>
       </p:sp>
@@ -14691,49 +14693,43 @@
             <p:ph type="body" sz="quarter" idx="153"/>
           </p:nvPr>
         </p:nvSpPr>
-        <p:spPr/>
+        <p:spPr>
+          <a:xfrm>
+            <a:off x="0" y="584363"/>
+            <a:ext cx="43891199" cy="2266623"/>
+          </a:xfrm>
+        </p:spPr>
         <p:txBody>
           <a:bodyPr>
-            <a:normAutofit fontScale="62500" lnSpcReduction="20000"/>
+            <a:normAutofit/>
           </a:bodyPr>
           <a:lstStyle/>
           <a:p>
             <a:r>
-              <a:rPr lang="en-US" b="0" dirty="0"/>
+              <a:rPr lang="en-US" sz="9200" b="0" dirty="0"/>
               <a:t>EavesDroid: Keystroke </a:t>
             </a:r>
             <a:r>
-              <a:rPr lang="en-US" b="0" dirty="0" smtClean="0"/>
+              <a:rPr lang="en-US" sz="9200" b="0" dirty="0" smtClean="0"/>
               <a:t>Recovery </a:t>
             </a:r>
             <a:r>
-              <a:rPr lang="en-US" b="0" dirty="0"/>
+              <a:rPr lang="en-US" sz="9200" b="0" dirty="0"/>
               <a:t>using </a:t>
             </a:r>
             <a:r>
-              <a:rPr lang="en-US" b="0" dirty="0" smtClean="0"/>
-              <a:t>Mobile </a:t>
+              <a:rPr lang="en-US" sz="9200" b="0" dirty="0" smtClean="0"/>
+              <a:t>Mobile Phone</a:t>
             </a:r>
             <a:r>
-              <a:rPr lang="en-US" b="0" dirty="0"/>
-              <a:t>P</a:t>
+              <a:rPr lang="en-US" sz="9200" b="0" dirty="0"/>
+              <a:t> </a:t>
             </a:r>
             <a:r>
-              <a:rPr lang="en-US" b="0" dirty="0" smtClean="0"/>
-              <a:t>hone</a:t>
+              <a:rPr lang="en-US" sz="9200" b="0" dirty="0" smtClean="0"/>
+              <a:t>Accelerometers</a:t>
             </a:r>
-            <a:endParaRPr lang="en-US" b="0" dirty="0"/>
-          </a:p>
-          <a:p>
-            <a:r>
-              <a:rPr lang="en-US" b="0" dirty="0"/>
-              <a:t>A</a:t>
-            </a:r>
-            <a:r>
-              <a:rPr lang="en-US" b="0" dirty="0" smtClean="0"/>
-              <a:t>ccelerometers</a:t>
-            </a:r>
-            <a:endParaRPr lang="en-US" dirty="0"/>
+            <a:endParaRPr lang="en-US" sz="9200" dirty="0"/>
           </a:p>
         </p:txBody>
       </p:sp>

</xml_diff>